<commit_message>
Added more with respect to LIME
</commit_message>
<xml_diff>
--- a/Final Submission/Images/v4.pptx
+++ b/Final Submission/Images/v4.pptx
@@ -2,7 +2,7 @@
 <file path=ppt/presentation.xml><?xml version="1.0" encoding="utf-8"?>
 <p:presentation xmlns:a="http://schemas.openxmlformats.org/drawingml/2006/main" xmlns:r="http://schemas.openxmlformats.org/officeDocument/2006/relationships" xmlns:p="http://schemas.openxmlformats.org/presentationml/2006/main" saveSubsetFonts="1">
   <p:sldMasterIdLst>
-    <p:sldMasterId id="2147483756" r:id="rId1"/>
+    <p:sldMasterId id="2147483780" r:id="rId1"/>
   </p:sldMasterIdLst>
   <p:sldIdLst>
     <p:sldId id="260" r:id="rId2"/>
@@ -15,7 +15,7 @@
     <p:sldId id="263" r:id="rId9"/>
     <p:sldId id="264" r:id="rId10"/>
   </p:sldIdLst>
-  <p:sldSz cx="31307088" cy="17610138"/>
+  <p:sldSz cx="41743313" cy="31307088"/>
   <p:notesSz cx="6858000" cy="9144000"/>
   <p:defaultTextStyle>
     <a:defPPr>
@@ -115,12 +115,12 @@
   <p:extLst>
     <p:ext uri="{EFAFB233-063F-42B5-8137-9DF3F51BA10A}">
       <p15:sldGuideLst xmlns:p15="http://schemas.microsoft.com/office/powerpoint/2012/main">
-        <p15:guide id="1" orient="horz" pos="5546" userDrawn="1">
+        <p15:guide id="1" orient="horz" pos="9860" userDrawn="1">
           <p15:clr>
             <a:srgbClr val="A4A3A4"/>
           </p15:clr>
         </p15:guide>
-        <p15:guide id="2" pos="9860" userDrawn="1">
+        <p15:guide id="2" pos="13146" userDrawn="1">
           <p15:clr>
             <a:srgbClr val="A4A3A4"/>
           </p15:clr>
@@ -160,15 +160,15 @@
         </p:nvSpPr>
         <p:spPr>
           <a:xfrm>
-            <a:off x="3913386" y="2882031"/>
-            <a:ext cx="23480316" cy="6130937"/>
+            <a:off x="3130749" y="5123639"/>
+            <a:ext cx="35481816" cy="10899505"/>
           </a:xfrm>
         </p:spPr>
         <p:txBody>
           <a:bodyPr anchor="b"/>
           <a:lstStyle>
             <a:lvl1pPr algn="ctr">
-              <a:defRPr sz="15407"/>
+              <a:defRPr sz="27390"/>
             </a:lvl1pPr>
           </a:lstStyle>
           <a:p>
@@ -192,8 +192,8 @@
         </p:nvSpPr>
         <p:spPr>
           <a:xfrm>
-            <a:off x="3913386" y="9249400"/>
-            <a:ext cx="23480316" cy="4251706"/>
+            <a:off x="5217914" y="16443471"/>
+            <a:ext cx="31307485" cy="7558630"/>
           </a:xfrm>
         </p:spPr>
         <p:txBody>
@@ -201,39 +201,39 @@
           <a:lstStyle>
             <a:lvl1pPr marL="0" indent="0" algn="ctr">
               <a:buNone/>
-              <a:defRPr sz="6163"/>
+              <a:defRPr sz="10956"/>
             </a:lvl1pPr>
-            <a:lvl2pPr marL="1173998" indent="0" algn="ctr">
-              <a:buNone/>
-              <a:defRPr sz="5136"/>
+            <a:lvl2pPr marL="2087118" indent="0" algn="ctr">
+              <a:buNone/>
+              <a:defRPr sz="9130"/>
             </a:lvl2pPr>
-            <a:lvl3pPr marL="2347996" indent="0" algn="ctr">
-              <a:buNone/>
-              <a:defRPr sz="4622"/>
+            <a:lvl3pPr marL="4174236" indent="0" algn="ctr">
+              <a:buNone/>
+              <a:defRPr sz="8217"/>
             </a:lvl3pPr>
-            <a:lvl4pPr marL="3521994" indent="0" algn="ctr">
-              <a:buNone/>
-              <a:defRPr sz="4108"/>
+            <a:lvl4pPr marL="6261354" indent="0" algn="ctr">
+              <a:buNone/>
+              <a:defRPr sz="7304"/>
             </a:lvl4pPr>
-            <a:lvl5pPr marL="4695993" indent="0" algn="ctr">
-              <a:buNone/>
-              <a:defRPr sz="4108"/>
+            <a:lvl5pPr marL="8348472" indent="0" algn="ctr">
+              <a:buNone/>
+              <a:defRPr sz="7304"/>
             </a:lvl5pPr>
-            <a:lvl6pPr marL="5869991" indent="0" algn="ctr">
-              <a:buNone/>
-              <a:defRPr sz="4108"/>
+            <a:lvl6pPr marL="10435590" indent="0" algn="ctr">
+              <a:buNone/>
+              <a:defRPr sz="7304"/>
             </a:lvl6pPr>
-            <a:lvl7pPr marL="7043989" indent="0" algn="ctr">
-              <a:buNone/>
-              <a:defRPr sz="4108"/>
+            <a:lvl7pPr marL="12522708" indent="0" algn="ctr">
+              <a:buNone/>
+              <a:defRPr sz="7304"/>
             </a:lvl7pPr>
-            <a:lvl8pPr marL="8217987" indent="0" algn="ctr">
-              <a:buNone/>
-              <a:defRPr sz="4108"/>
+            <a:lvl8pPr marL="14609826" indent="0" algn="ctr">
+              <a:buNone/>
+              <a:defRPr sz="7304"/>
             </a:lvl8pPr>
-            <a:lvl9pPr marL="9391985" indent="0" algn="ctr">
-              <a:buNone/>
-              <a:defRPr sz="4108"/>
+            <a:lvl9pPr marL="16696944" indent="0" algn="ctr">
+              <a:buNone/>
+              <a:defRPr sz="7304"/>
             </a:lvl9pPr>
           </a:lstStyle>
           <a:p>
@@ -262,7 +262,7 @@
           <a:p>
             <a:fld id="{486C7C19-CDD6-4A52-B0C8-0C80AAE84465}" type="datetimeFigureOut">
               <a:rPr lang="en-US" smtClean="0"/>
-              <a:t>26-May-21</a:t>
+              <a:t>27-May-21</a:t>
             </a:fld>
             <a:endParaRPr lang="en-US"/>
           </a:p>
@@ -313,7 +313,7 @@
     </p:spTree>
     <p:extLst>
       <p:ext uri="{BB962C8B-B14F-4D97-AF65-F5344CB8AC3E}">
-        <p14:creationId xmlns:p14="http://schemas.microsoft.com/office/powerpoint/2010/main" val="1817582374"/>
+        <p14:creationId xmlns:p14="http://schemas.microsoft.com/office/powerpoint/2010/main" val="215588696"/>
       </p:ext>
     </p:extLst>
   </p:cSld>
@@ -432,7 +432,7 @@
           <a:p>
             <a:fld id="{486C7C19-CDD6-4A52-B0C8-0C80AAE84465}" type="datetimeFigureOut">
               <a:rPr lang="en-US" smtClean="0"/>
-              <a:t>26-May-21</a:t>
+              <a:t>27-May-21</a:t>
             </a:fld>
             <a:endParaRPr lang="en-US"/>
           </a:p>
@@ -483,7 +483,7 @@
     </p:spTree>
     <p:extLst>
       <p:ext uri="{BB962C8B-B14F-4D97-AF65-F5344CB8AC3E}">
-        <p14:creationId xmlns:p14="http://schemas.microsoft.com/office/powerpoint/2010/main" val="1011737827"/>
+        <p14:creationId xmlns:p14="http://schemas.microsoft.com/office/powerpoint/2010/main" val="288420729"/>
       </p:ext>
     </p:extLst>
   </p:cSld>
@@ -522,8 +522,8 @@
         </p:nvSpPr>
         <p:spPr>
           <a:xfrm>
-            <a:off x="22404135" y="937577"/>
-            <a:ext cx="6750591" cy="14923778"/>
+            <a:off x="29872561" y="1666813"/>
+            <a:ext cx="9000902" cy="26531310"/>
           </a:xfrm>
         </p:spPr>
         <p:txBody>
@@ -550,8 +550,8 @@
         </p:nvSpPr>
         <p:spPr>
           <a:xfrm>
-            <a:off x="2152362" y="937577"/>
-            <a:ext cx="19860434" cy="14923778"/>
+            <a:off x="2869855" y="1666813"/>
+            <a:ext cx="26480914" cy="26531310"/>
           </a:xfrm>
         </p:spPr>
         <p:txBody>
@@ -612,7 +612,7 @@
           <a:p>
             <a:fld id="{486C7C19-CDD6-4A52-B0C8-0C80AAE84465}" type="datetimeFigureOut">
               <a:rPr lang="en-US" smtClean="0"/>
-              <a:t>26-May-21</a:t>
+              <a:t>27-May-21</a:t>
             </a:fld>
             <a:endParaRPr lang="en-US"/>
           </a:p>
@@ -663,7 +663,7 @@
     </p:spTree>
     <p:extLst>
       <p:ext uri="{BB962C8B-B14F-4D97-AF65-F5344CB8AC3E}">
-        <p14:creationId xmlns:p14="http://schemas.microsoft.com/office/powerpoint/2010/main" val="1238197698"/>
+        <p14:creationId xmlns:p14="http://schemas.microsoft.com/office/powerpoint/2010/main" val="3668739648"/>
       </p:ext>
     </p:extLst>
   </p:cSld>
@@ -782,7 +782,7 @@
           <a:p>
             <a:fld id="{486C7C19-CDD6-4A52-B0C8-0C80AAE84465}" type="datetimeFigureOut">
               <a:rPr lang="en-US" smtClean="0"/>
-              <a:t>26-May-21</a:t>
+              <a:t>27-May-21</a:t>
             </a:fld>
             <a:endParaRPr lang="en-US"/>
           </a:p>
@@ -833,7 +833,7 @@
     </p:spTree>
     <p:extLst>
       <p:ext uri="{BB962C8B-B14F-4D97-AF65-F5344CB8AC3E}">
-        <p14:creationId xmlns:p14="http://schemas.microsoft.com/office/powerpoint/2010/main" val="2429026088"/>
+        <p14:creationId xmlns:p14="http://schemas.microsoft.com/office/powerpoint/2010/main" val="2094758277"/>
       </p:ext>
     </p:extLst>
   </p:cSld>
@@ -872,15 +872,15 @@
         </p:nvSpPr>
         <p:spPr>
           <a:xfrm>
-            <a:off x="2136057" y="4390308"/>
-            <a:ext cx="27002363" cy="7325327"/>
+            <a:off x="2848114" y="7805040"/>
+            <a:ext cx="36003607" cy="13022877"/>
           </a:xfrm>
         </p:spPr>
         <p:txBody>
           <a:bodyPr anchor="b"/>
           <a:lstStyle>
             <a:lvl1pPr>
-              <a:defRPr sz="15407"/>
+              <a:defRPr sz="27390"/>
             </a:lvl1pPr>
           </a:lstStyle>
           <a:p>
@@ -904,8 +904,8 @@
         </p:nvSpPr>
         <p:spPr>
           <a:xfrm>
-            <a:off x="2136057" y="11784935"/>
-            <a:ext cx="27002363" cy="3852216"/>
+            <a:off x="2848114" y="20951118"/>
+            <a:ext cx="36003607" cy="6848423"/>
           </a:xfrm>
         </p:spPr>
         <p:txBody>
@@ -913,17 +913,15 @@
           <a:lstStyle>
             <a:lvl1pPr marL="0" indent="0">
               <a:buNone/>
-              <a:defRPr sz="6163">
+              <a:defRPr sz="10956">
                 <a:solidFill>
-                  <a:schemeClr val="tx1">
-                    <a:tint val="75000"/>
-                  </a:schemeClr>
+                  <a:schemeClr val="tx1"/>
                 </a:solidFill>
               </a:defRPr>
             </a:lvl1pPr>
-            <a:lvl2pPr marL="1173998" indent="0">
-              <a:buNone/>
-              <a:defRPr sz="5136">
+            <a:lvl2pPr marL="2087118" indent="0">
+              <a:buNone/>
+              <a:defRPr sz="9130">
                 <a:solidFill>
                   <a:schemeClr val="tx1">
                     <a:tint val="75000"/>
@@ -931,9 +929,9 @@
                 </a:solidFill>
               </a:defRPr>
             </a:lvl2pPr>
-            <a:lvl3pPr marL="2347996" indent="0">
-              <a:buNone/>
-              <a:defRPr sz="4622">
+            <a:lvl3pPr marL="4174236" indent="0">
+              <a:buNone/>
+              <a:defRPr sz="8217">
                 <a:solidFill>
                   <a:schemeClr val="tx1">
                     <a:tint val="75000"/>
@@ -941,9 +939,9 @@
                 </a:solidFill>
               </a:defRPr>
             </a:lvl3pPr>
-            <a:lvl4pPr marL="3521994" indent="0">
-              <a:buNone/>
-              <a:defRPr sz="4108">
+            <a:lvl4pPr marL="6261354" indent="0">
+              <a:buNone/>
+              <a:defRPr sz="7304">
                 <a:solidFill>
                   <a:schemeClr val="tx1">
                     <a:tint val="75000"/>
@@ -951,9 +949,9 @@
                 </a:solidFill>
               </a:defRPr>
             </a:lvl4pPr>
-            <a:lvl5pPr marL="4695993" indent="0">
-              <a:buNone/>
-              <a:defRPr sz="4108">
+            <a:lvl5pPr marL="8348472" indent="0">
+              <a:buNone/>
+              <a:defRPr sz="7304">
                 <a:solidFill>
                   <a:schemeClr val="tx1">
                     <a:tint val="75000"/>
@@ -961,9 +959,9 @@
                 </a:solidFill>
               </a:defRPr>
             </a:lvl5pPr>
-            <a:lvl6pPr marL="5869991" indent="0">
-              <a:buNone/>
-              <a:defRPr sz="4108">
+            <a:lvl6pPr marL="10435590" indent="0">
+              <a:buNone/>
+              <a:defRPr sz="7304">
                 <a:solidFill>
                   <a:schemeClr val="tx1">
                     <a:tint val="75000"/>
@@ -971,9 +969,9 @@
                 </a:solidFill>
               </a:defRPr>
             </a:lvl6pPr>
-            <a:lvl7pPr marL="7043989" indent="0">
-              <a:buNone/>
-              <a:defRPr sz="4108">
+            <a:lvl7pPr marL="12522708" indent="0">
+              <a:buNone/>
+              <a:defRPr sz="7304">
                 <a:solidFill>
                   <a:schemeClr val="tx1">
                     <a:tint val="75000"/>
@@ -981,9 +979,9 @@
                 </a:solidFill>
               </a:defRPr>
             </a:lvl7pPr>
-            <a:lvl8pPr marL="8217987" indent="0">
-              <a:buNone/>
-              <a:defRPr sz="4108">
+            <a:lvl8pPr marL="14609826" indent="0">
+              <a:buNone/>
+              <a:defRPr sz="7304">
                 <a:solidFill>
                   <a:schemeClr val="tx1">
                     <a:tint val="75000"/>
@@ -991,9 +989,9 @@
                 </a:solidFill>
               </a:defRPr>
             </a:lvl8pPr>
-            <a:lvl9pPr marL="9391985" indent="0">
-              <a:buNone/>
-              <a:defRPr sz="4108">
+            <a:lvl9pPr marL="16696944" indent="0">
+              <a:buNone/>
+              <a:defRPr sz="7304">
                 <a:solidFill>
                   <a:schemeClr val="tx1">
                     <a:tint val="75000"/>
@@ -1028,7 +1026,7 @@
           <a:p>
             <a:fld id="{486C7C19-CDD6-4A52-B0C8-0C80AAE84465}" type="datetimeFigureOut">
               <a:rPr lang="en-US" smtClean="0"/>
-              <a:t>26-May-21</a:t>
+              <a:t>27-May-21</a:t>
             </a:fld>
             <a:endParaRPr lang="en-US"/>
           </a:p>
@@ -1079,7 +1077,7 @@
     </p:spTree>
     <p:extLst>
       <p:ext uri="{BB962C8B-B14F-4D97-AF65-F5344CB8AC3E}">
-        <p14:creationId xmlns:p14="http://schemas.microsoft.com/office/powerpoint/2010/main" val="1422156721"/>
+        <p14:creationId xmlns:p14="http://schemas.microsoft.com/office/powerpoint/2010/main" val="675058403"/>
       </p:ext>
     </p:extLst>
   </p:cSld>
@@ -1141,8 +1139,8 @@
         </p:nvSpPr>
         <p:spPr>
           <a:xfrm>
-            <a:off x="2152363" y="4687884"/>
-            <a:ext cx="13305512" cy="11173471"/>
+            <a:off x="2869853" y="8334063"/>
+            <a:ext cx="17740908" cy="19864060"/>
           </a:xfrm>
         </p:spPr>
         <p:txBody>
@@ -1198,8 +1196,8 @@
         </p:nvSpPr>
         <p:spPr>
           <a:xfrm>
-            <a:off x="15849214" y="4687884"/>
-            <a:ext cx="13305512" cy="11173471"/>
+            <a:off x="21132552" y="8334063"/>
+            <a:ext cx="17740908" cy="19864060"/>
           </a:xfrm>
         </p:spPr>
         <p:txBody>
@@ -1260,7 +1258,7 @@
           <a:p>
             <a:fld id="{486C7C19-CDD6-4A52-B0C8-0C80AAE84465}" type="datetimeFigureOut">
               <a:rPr lang="en-US" smtClean="0"/>
-              <a:t>26-May-21</a:t>
+              <a:t>27-May-21</a:t>
             </a:fld>
             <a:endParaRPr lang="en-US"/>
           </a:p>
@@ -1311,7 +1309,7 @@
     </p:spTree>
     <p:extLst>
       <p:ext uri="{BB962C8B-B14F-4D97-AF65-F5344CB8AC3E}">
-        <p14:creationId xmlns:p14="http://schemas.microsoft.com/office/powerpoint/2010/main" val="4116881367"/>
+        <p14:creationId xmlns:p14="http://schemas.microsoft.com/office/powerpoint/2010/main" val="3163853075"/>
       </p:ext>
     </p:extLst>
   </p:cSld>
@@ -1350,8 +1348,8 @@
         </p:nvSpPr>
         <p:spPr>
           <a:xfrm>
-            <a:off x="2156440" y="937578"/>
-            <a:ext cx="27002363" cy="3403813"/>
+            <a:off x="2875290" y="1666819"/>
+            <a:ext cx="36003607" cy="6051257"/>
           </a:xfrm>
         </p:spPr>
         <p:txBody>
@@ -1378,8 +1376,8 @@
         </p:nvSpPr>
         <p:spPr>
           <a:xfrm>
-            <a:off x="2156442" y="4316931"/>
-            <a:ext cx="13244364" cy="2115661"/>
+            <a:off x="2875295" y="7674587"/>
+            <a:ext cx="17659375" cy="3761196"/>
           </a:xfrm>
         </p:spPr>
         <p:txBody>
@@ -1387,39 +1385,39 @@
           <a:lstStyle>
             <a:lvl1pPr marL="0" indent="0">
               <a:buNone/>
-              <a:defRPr sz="6163" b="1"/>
+              <a:defRPr sz="10956" b="1"/>
             </a:lvl1pPr>
-            <a:lvl2pPr marL="1173998" indent="0">
-              <a:buNone/>
-              <a:defRPr sz="5136" b="1"/>
+            <a:lvl2pPr marL="2087118" indent="0">
+              <a:buNone/>
+              <a:defRPr sz="9130" b="1"/>
             </a:lvl2pPr>
-            <a:lvl3pPr marL="2347996" indent="0">
-              <a:buNone/>
-              <a:defRPr sz="4622" b="1"/>
+            <a:lvl3pPr marL="4174236" indent="0">
+              <a:buNone/>
+              <a:defRPr sz="8217" b="1"/>
             </a:lvl3pPr>
-            <a:lvl4pPr marL="3521994" indent="0">
-              <a:buNone/>
-              <a:defRPr sz="4108" b="1"/>
+            <a:lvl4pPr marL="6261354" indent="0">
+              <a:buNone/>
+              <a:defRPr sz="7304" b="1"/>
             </a:lvl4pPr>
-            <a:lvl5pPr marL="4695993" indent="0">
-              <a:buNone/>
-              <a:defRPr sz="4108" b="1"/>
+            <a:lvl5pPr marL="8348472" indent="0">
+              <a:buNone/>
+              <a:defRPr sz="7304" b="1"/>
             </a:lvl5pPr>
-            <a:lvl6pPr marL="5869991" indent="0">
-              <a:buNone/>
-              <a:defRPr sz="4108" b="1"/>
+            <a:lvl6pPr marL="10435590" indent="0">
+              <a:buNone/>
+              <a:defRPr sz="7304" b="1"/>
             </a:lvl6pPr>
-            <a:lvl7pPr marL="7043989" indent="0">
-              <a:buNone/>
-              <a:defRPr sz="4108" b="1"/>
+            <a:lvl7pPr marL="12522708" indent="0">
+              <a:buNone/>
+              <a:defRPr sz="7304" b="1"/>
             </a:lvl7pPr>
-            <a:lvl8pPr marL="8217987" indent="0">
-              <a:buNone/>
-              <a:defRPr sz="4108" b="1"/>
+            <a:lvl8pPr marL="14609826" indent="0">
+              <a:buNone/>
+              <a:defRPr sz="7304" b="1"/>
             </a:lvl8pPr>
-            <a:lvl9pPr marL="9391985" indent="0">
-              <a:buNone/>
-              <a:defRPr sz="4108" b="1"/>
+            <a:lvl9pPr marL="16696944" indent="0">
+              <a:buNone/>
+              <a:defRPr sz="7304" b="1"/>
             </a:lvl9pPr>
           </a:lstStyle>
           <a:p>
@@ -1443,8 +1441,8 @@
         </p:nvSpPr>
         <p:spPr>
           <a:xfrm>
-            <a:off x="2156442" y="6432592"/>
-            <a:ext cx="13244364" cy="9461374"/>
+            <a:off x="2875295" y="11435784"/>
+            <a:ext cx="17659375" cy="16820315"/>
           </a:xfrm>
         </p:spPr>
         <p:txBody>
@@ -1500,8 +1498,8 @@
         </p:nvSpPr>
         <p:spPr>
           <a:xfrm>
-            <a:off x="15849213" y="4316931"/>
-            <a:ext cx="13309590" cy="2115661"/>
+            <a:off x="21132555" y="7674587"/>
+            <a:ext cx="17746345" cy="3761196"/>
           </a:xfrm>
         </p:spPr>
         <p:txBody>
@@ -1509,39 +1507,39 @@
           <a:lstStyle>
             <a:lvl1pPr marL="0" indent="0">
               <a:buNone/>
-              <a:defRPr sz="6163" b="1"/>
+              <a:defRPr sz="10956" b="1"/>
             </a:lvl1pPr>
-            <a:lvl2pPr marL="1173998" indent="0">
-              <a:buNone/>
-              <a:defRPr sz="5136" b="1"/>
+            <a:lvl2pPr marL="2087118" indent="0">
+              <a:buNone/>
+              <a:defRPr sz="9130" b="1"/>
             </a:lvl2pPr>
-            <a:lvl3pPr marL="2347996" indent="0">
-              <a:buNone/>
-              <a:defRPr sz="4622" b="1"/>
+            <a:lvl3pPr marL="4174236" indent="0">
+              <a:buNone/>
+              <a:defRPr sz="8217" b="1"/>
             </a:lvl3pPr>
-            <a:lvl4pPr marL="3521994" indent="0">
-              <a:buNone/>
-              <a:defRPr sz="4108" b="1"/>
+            <a:lvl4pPr marL="6261354" indent="0">
+              <a:buNone/>
+              <a:defRPr sz="7304" b="1"/>
             </a:lvl4pPr>
-            <a:lvl5pPr marL="4695993" indent="0">
-              <a:buNone/>
-              <a:defRPr sz="4108" b="1"/>
+            <a:lvl5pPr marL="8348472" indent="0">
+              <a:buNone/>
+              <a:defRPr sz="7304" b="1"/>
             </a:lvl5pPr>
-            <a:lvl6pPr marL="5869991" indent="0">
-              <a:buNone/>
-              <a:defRPr sz="4108" b="1"/>
+            <a:lvl6pPr marL="10435590" indent="0">
+              <a:buNone/>
+              <a:defRPr sz="7304" b="1"/>
             </a:lvl6pPr>
-            <a:lvl7pPr marL="7043989" indent="0">
-              <a:buNone/>
-              <a:defRPr sz="4108" b="1"/>
+            <a:lvl7pPr marL="12522708" indent="0">
+              <a:buNone/>
+              <a:defRPr sz="7304" b="1"/>
             </a:lvl7pPr>
-            <a:lvl8pPr marL="8217987" indent="0">
-              <a:buNone/>
-              <a:defRPr sz="4108" b="1"/>
+            <a:lvl8pPr marL="14609826" indent="0">
+              <a:buNone/>
+              <a:defRPr sz="7304" b="1"/>
             </a:lvl8pPr>
-            <a:lvl9pPr marL="9391985" indent="0">
-              <a:buNone/>
-              <a:defRPr sz="4108" b="1"/>
+            <a:lvl9pPr marL="16696944" indent="0">
+              <a:buNone/>
+              <a:defRPr sz="7304" b="1"/>
             </a:lvl9pPr>
           </a:lstStyle>
           <a:p>
@@ -1565,8 +1563,8 @@
         </p:nvSpPr>
         <p:spPr>
           <a:xfrm>
-            <a:off x="15849213" y="6432592"/>
-            <a:ext cx="13309590" cy="9461374"/>
+            <a:off x="21132555" y="11435784"/>
+            <a:ext cx="17746345" cy="16820315"/>
           </a:xfrm>
         </p:spPr>
         <p:txBody>
@@ -1627,7 +1625,7 @@
           <a:p>
             <a:fld id="{486C7C19-CDD6-4A52-B0C8-0C80AAE84465}" type="datetimeFigureOut">
               <a:rPr lang="en-US" smtClean="0"/>
-              <a:t>26-May-21</a:t>
+              <a:t>27-May-21</a:t>
             </a:fld>
             <a:endParaRPr lang="en-US"/>
           </a:p>
@@ -1678,7 +1676,7 @@
     </p:spTree>
     <p:extLst>
       <p:ext uri="{BB962C8B-B14F-4D97-AF65-F5344CB8AC3E}">
-        <p14:creationId xmlns:p14="http://schemas.microsoft.com/office/powerpoint/2010/main" val="1927852938"/>
+        <p14:creationId xmlns:p14="http://schemas.microsoft.com/office/powerpoint/2010/main" val="1772249429"/>
       </p:ext>
     </p:extLst>
   </p:cSld>
@@ -1745,7 +1743,7 @@
           <a:p>
             <a:fld id="{486C7C19-CDD6-4A52-B0C8-0C80AAE84465}" type="datetimeFigureOut">
               <a:rPr lang="en-US" smtClean="0"/>
-              <a:t>26-May-21</a:t>
+              <a:t>27-May-21</a:t>
             </a:fld>
             <a:endParaRPr lang="en-US"/>
           </a:p>
@@ -1796,7 +1794,7 @@
     </p:spTree>
     <p:extLst>
       <p:ext uri="{BB962C8B-B14F-4D97-AF65-F5344CB8AC3E}">
-        <p14:creationId xmlns:p14="http://schemas.microsoft.com/office/powerpoint/2010/main" val="3789801767"/>
+        <p14:creationId xmlns:p14="http://schemas.microsoft.com/office/powerpoint/2010/main" val="3106473197"/>
       </p:ext>
     </p:extLst>
   </p:cSld>
@@ -1840,7 +1838,7 @@
           <a:p>
             <a:fld id="{486C7C19-CDD6-4A52-B0C8-0C80AAE84465}" type="datetimeFigureOut">
               <a:rPr lang="en-US" smtClean="0"/>
-              <a:t>26-May-21</a:t>
+              <a:t>27-May-21</a:t>
             </a:fld>
             <a:endParaRPr lang="en-US"/>
           </a:p>
@@ -1891,7 +1889,7 @@
     </p:spTree>
     <p:extLst>
       <p:ext uri="{BB962C8B-B14F-4D97-AF65-F5344CB8AC3E}">
-        <p14:creationId xmlns:p14="http://schemas.microsoft.com/office/powerpoint/2010/main" val="1743526605"/>
+        <p14:creationId xmlns:p14="http://schemas.microsoft.com/office/powerpoint/2010/main" val="2992786587"/>
       </p:ext>
     </p:extLst>
   </p:cSld>
@@ -1930,15 +1928,15 @@
         </p:nvSpPr>
         <p:spPr>
           <a:xfrm>
-            <a:off x="2156441" y="1174009"/>
-            <a:ext cx="10097350" cy="4109032"/>
+            <a:off x="2875290" y="2087139"/>
+            <a:ext cx="13463305" cy="7304987"/>
           </a:xfrm>
         </p:spPr>
         <p:txBody>
           <a:bodyPr anchor="b"/>
           <a:lstStyle>
             <a:lvl1pPr>
-              <a:defRPr sz="8217"/>
+              <a:defRPr sz="14608"/>
             </a:lvl1pPr>
           </a:lstStyle>
           <a:p>
@@ -1962,39 +1960,39 @@
         </p:nvSpPr>
         <p:spPr>
           <a:xfrm>
-            <a:off x="13309590" y="2535535"/>
-            <a:ext cx="15849213" cy="12514612"/>
+            <a:off x="17746345" y="4507648"/>
+            <a:ext cx="21132552" cy="22248324"/>
           </a:xfrm>
         </p:spPr>
         <p:txBody>
           <a:bodyPr/>
           <a:lstStyle>
             <a:lvl1pPr>
-              <a:defRPr sz="8217"/>
+              <a:defRPr sz="14608"/>
             </a:lvl1pPr>
             <a:lvl2pPr>
-              <a:defRPr sz="7190"/>
+              <a:defRPr sz="12782"/>
             </a:lvl2pPr>
             <a:lvl3pPr>
-              <a:defRPr sz="6163"/>
+              <a:defRPr sz="10956"/>
             </a:lvl3pPr>
             <a:lvl4pPr>
-              <a:defRPr sz="5136"/>
+              <a:defRPr sz="9130"/>
             </a:lvl4pPr>
             <a:lvl5pPr>
-              <a:defRPr sz="5136"/>
+              <a:defRPr sz="9130"/>
             </a:lvl5pPr>
             <a:lvl6pPr>
-              <a:defRPr sz="5136"/>
+              <a:defRPr sz="9130"/>
             </a:lvl6pPr>
             <a:lvl7pPr>
-              <a:defRPr sz="5136"/>
+              <a:defRPr sz="9130"/>
             </a:lvl7pPr>
             <a:lvl8pPr>
-              <a:defRPr sz="5136"/>
+              <a:defRPr sz="9130"/>
             </a:lvl8pPr>
             <a:lvl9pPr>
-              <a:defRPr sz="5136"/>
+              <a:defRPr sz="9130"/>
             </a:lvl9pPr>
           </a:lstStyle>
           <a:p>
@@ -2047,8 +2045,8 @@
         </p:nvSpPr>
         <p:spPr>
           <a:xfrm>
-            <a:off x="2156441" y="5283041"/>
-            <a:ext cx="10097350" cy="9787488"/>
+            <a:off x="2875290" y="9392126"/>
+            <a:ext cx="13463305" cy="17400076"/>
           </a:xfrm>
         </p:spPr>
         <p:txBody>
@@ -2056,39 +2054,39 @@
           <a:lstStyle>
             <a:lvl1pPr marL="0" indent="0">
               <a:buNone/>
-              <a:defRPr sz="4108"/>
+              <a:defRPr sz="7304"/>
             </a:lvl1pPr>
-            <a:lvl2pPr marL="1173998" indent="0">
-              <a:buNone/>
-              <a:defRPr sz="3595"/>
+            <a:lvl2pPr marL="2087118" indent="0">
+              <a:buNone/>
+              <a:defRPr sz="6391"/>
             </a:lvl2pPr>
-            <a:lvl3pPr marL="2347996" indent="0">
-              <a:buNone/>
-              <a:defRPr sz="3081"/>
+            <a:lvl3pPr marL="4174236" indent="0">
+              <a:buNone/>
+              <a:defRPr sz="5478"/>
             </a:lvl3pPr>
-            <a:lvl4pPr marL="3521994" indent="0">
-              <a:buNone/>
-              <a:defRPr sz="2568"/>
+            <a:lvl4pPr marL="6261354" indent="0">
+              <a:buNone/>
+              <a:defRPr sz="4565"/>
             </a:lvl4pPr>
-            <a:lvl5pPr marL="4695993" indent="0">
-              <a:buNone/>
-              <a:defRPr sz="2568"/>
+            <a:lvl5pPr marL="8348472" indent="0">
+              <a:buNone/>
+              <a:defRPr sz="4565"/>
             </a:lvl5pPr>
-            <a:lvl6pPr marL="5869991" indent="0">
-              <a:buNone/>
-              <a:defRPr sz="2568"/>
+            <a:lvl6pPr marL="10435590" indent="0">
+              <a:buNone/>
+              <a:defRPr sz="4565"/>
             </a:lvl6pPr>
-            <a:lvl7pPr marL="7043989" indent="0">
-              <a:buNone/>
-              <a:defRPr sz="2568"/>
+            <a:lvl7pPr marL="12522708" indent="0">
+              <a:buNone/>
+              <a:defRPr sz="4565"/>
             </a:lvl7pPr>
-            <a:lvl8pPr marL="8217987" indent="0">
-              <a:buNone/>
-              <a:defRPr sz="2568"/>
+            <a:lvl8pPr marL="14609826" indent="0">
+              <a:buNone/>
+              <a:defRPr sz="4565"/>
             </a:lvl8pPr>
-            <a:lvl9pPr marL="9391985" indent="0">
-              <a:buNone/>
-              <a:defRPr sz="2568"/>
+            <a:lvl9pPr marL="16696944" indent="0">
+              <a:buNone/>
+              <a:defRPr sz="4565"/>
             </a:lvl9pPr>
           </a:lstStyle>
           <a:p>
@@ -2117,7 +2115,7 @@
           <a:p>
             <a:fld id="{486C7C19-CDD6-4A52-B0C8-0C80AAE84465}" type="datetimeFigureOut">
               <a:rPr lang="en-US" smtClean="0"/>
-              <a:t>26-May-21</a:t>
+              <a:t>27-May-21</a:t>
             </a:fld>
             <a:endParaRPr lang="en-US"/>
           </a:p>
@@ -2168,7 +2166,7 @@
     </p:spTree>
     <p:extLst>
       <p:ext uri="{BB962C8B-B14F-4D97-AF65-F5344CB8AC3E}">
-        <p14:creationId xmlns:p14="http://schemas.microsoft.com/office/powerpoint/2010/main" val="665467882"/>
+        <p14:creationId xmlns:p14="http://schemas.microsoft.com/office/powerpoint/2010/main" val="482786312"/>
       </p:ext>
     </p:extLst>
   </p:cSld>
@@ -2207,15 +2205,15 @@
         </p:nvSpPr>
         <p:spPr>
           <a:xfrm>
-            <a:off x="2156441" y="1174009"/>
-            <a:ext cx="10097350" cy="4109032"/>
+            <a:off x="2875290" y="2087139"/>
+            <a:ext cx="13463305" cy="7304987"/>
           </a:xfrm>
         </p:spPr>
         <p:txBody>
           <a:bodyPr anchor="b"/>
           <a:lstStyle>
             <a:lvl1pPr>
-              <a:defRPr sz="8217"/>
+              <a:defRPr sz="14608"/>
             </a:lvl1pPr>
           </a:lstStyle>
           <a:p>
@@ -2239,8 +2237,8 @@
         </p:nvSpPr>
         <p:spPr>
           <a:xfrm>
-            <a:off x="13309590" y="2535535"/>
-            <a:ext cx="15849213" cy="12514612"/>
+            <a:off x="17746345" y="4507648"/>
+            <a:ext cx="21132552" cy="22248324"/>
           </a:xfrm>
         </p:spPr>
         <p:txBody>
@@ -2248,39 +2246,39 @@
           <a:lstStyle>
             <a:lvl1pPr marL="0" indent="0">
               <a:buNone/>
-              <a:defRPr sz="8217"/>
+              <a:defRPr sz="14608"/>
             </a:lvl1pPr>
-            <a:lvl2pPr marL="1173998" indent="0">
-              <a:buNone/>
-              <a:defRPr sz="7190"/>
+            <a:lvl2pPr marL="2087118" indent="0">
+              <a:buNone/>
+              <a:defRPr sz="12782"/>
             </a:lvl2pPr>
-            <a:lvl3pPr marL="2347996" indent="0">
-              <a:buNone/>
-              <a:defRPr sz="6163"/>
+            <a:lvl3pPr marL="4174236" indent="0">
+              <a:buNone/>
+              <a:defRPr sz="10956"/>
             </a:lvl3pPr>
-            <a:lvl4pPr marL="3521994" indent="0">
-              <a:buNone/>
-              <a:defRPr sz="5136"/>
+            <a:lvl4pPr marL="6261354" indent="0">
+              <a:buNone/>
+              <a:defRPr sz="9130"/>
             </a:lvl4pPr>
-            <a:lvl5pPr marL="4695993" indent="0">
-              <a:buNone/>
-              <a:defRPr sz="5136"/>
+            <a:lvl5pPr marL="8348472" indent="0">
+              <a:buNone/>
+              <a:defRPr sz="9130"/>
             </a:lvl5pPr>
-            <a:lvl6pPr marL="5869991" indent="0">
-              <a:buNone/>
-              <a:defRPr sz="5136"/>
+            <a:lvl6pPr marL="10435590" indent="0">
+              <a:buNone/>
+              <a:defRPr sz="9130"/>
             </a:lvl6pPr>
-            <a:lvl7pPr marL="7043989" indent="0">
-              <a:buNone/>
-              <a:defRPr sz="5136"/>
+            <a:lvl7pPr marL="12522708" indent="0">
+              <a:buNone/>
+              <a:defRPr sz="9130"/>
             </a:lvl7pPr>
-            <a:lvl8pPr marL="8217987" indent="0">
-              <a:buNone/>
-              <a:defRPr sz="5136"/>
+            <a:lvl8pPr marL="14609826" indent="0">
+              <a:buNone/>
+              <a:defRPr sz="9130"/>
             </a:lvl8pPr>
-            <a:lvl9pPr marL="9391985" indent="0">
-              <a:buNone/>
-              <a:defRPr sz="5136"/>
+            <a:lvl9pPr marL="16696944" indent="0">
+              <a:buNone/>
+              <a:defRPr sz="9130"/>
             </a:lvl9pPr>
           </a:lstStyle>
           <a:p>
@@ -2304,8 +2302,8 @@
         </p:nvSpPr>
         <p:spPr>
           <a:xfrm>
-            <a:off x="2156441" y="5283041"/>
-            <a:ext cx="10097350" cy="9787488"/>
+            <a:off x="2875290" y="9392126"/>
+            <a:ext cx="13463305" cy="17400076"/>
           </a:xfrm>
         </p:spPr>
         <p:txBody>
@@ -2313,39 +2311,39 @@
           <a:lstStyle>
             <a:lvl1pPr marL="0" indent="0">
               <a:buNone/>
-              <a:defRPr sz="4108"/>
+              <a:defRPr sz="7304"/>
             </a:lvl1pPr>
-            <a:lvl2pPr marL="1173998" indent="0">
-              <a:buNone/>
-              <a:defRPr sz="3595"/>
+            <a:lvl2pPr marL="2087118" indent="0">
+              <a:buNone/>
+              <a:defRPr sz="6391"/>
             </a:lvl2pPr>
-            <a:lvl3pPr marL="2347996" indent="0">
-              <a:buNone/>
-              <a:defRPr sz="3081"/>
+            <a:lvl3pPr marL="4174236" indent="0">
+              <a:buNone/>
+              <a:defRPr sz="5478"/>
             </a:lvl3pPr>
-            <a:lvl4pPr marL="3521994" indent="0">
-              <a:buNone/>
-              <a:defRPr sz="2568"/>
+            <a:lvl4pPr marL="6261354" indent="0">
+              <a:buNone/>
+              <a:defRPr sz="4565"/>
             </a:lvl4pPr>
-            <a:lvl5pPr marL="4695993" indent="0">
-              <a:buNone/>
-              <a:defRPr sz="2568"/>
+            <a:lvl5pPr marL="8348472" indent="0">
+              <a:buNone/>
+              <a:defRPr sz="4565"/>
             </a:lvl5pPr>
-            <a:lvl6pPr marL="5869991" indent="0">
-              <a:buNone/>
-              <a:defRPr sz="2568"/>
+            <a:lvl6pPr marL="10435590" indent="0">
+              <a:buNone/>
+              <a:defRPr sz="4565"/>
             </a:lvl6pPr>
-            <a:lvl7pPr marL="7043989" indent="0">
-              <a:buNone/>
-              <a:defRPr sz="2568"/>
+            <a:lvl7pPr marL="12522708" indent="0">
+              <a:buNone/>
+              <a:defRPr sz="4565"/>
             </a:lvl7pPr>
-            <a:lvl8pPr marL="8217987" indent="0">
-              <a:buNone/>
-              <a:defRPr sz="2568"/>
+            <a:lvl8pPr marL="14609826" indent="0">
+              <a:buNone/>
+              <a:defRPr sz="4565"/>
             </a:lvl8pPr>
-            <a:lvl9pPr marL="9391985" indent="0">
-              <a:buNone/>
-              <a:defRPr sz="2568"/>
+            <a:lvl9pPr marL="16696944" indent="0">
+              <a:buNone/>
+              <a:defRPr sz="4565"/>
             </a:lvl9pPr>
           </a:lstStyle>
           <a:p>
@@ -2374,7 +2372,7 @@
           <a:p>
             <a:fld id="{486C7C19-CDD6-4A52-B0C8-0C80AAE84465}" type="datetimeFigureOut">
               <a:rPr lang="en-US" smtClean="0"/>
-              <a:t>26-May-21</a:t>
+              <a:t>27-May-21</a:t>
             </a:fld>
             <a:endParaRPr lang="en-US"/>
           </a:p>
@@ -2425,7 +2423,7 @@
     </p:spTree>
     <p:extLst>
       <p:ext uri="{BB962C8B-B14F-4D97-AF65-F5344CB8AC3E}">
-        <p14:creationId xmlns:p14="http://schemas.microsoft.com/office/powerpoint/2010/main" val="3114834094"/>
+        <p14:creationId xmlns:p14="http://schemas.microsoft.com/office/powerpoint/2010/main" val="1049742512"/>
       </p:ext>
     </p:extLst>
   </p:cSld>
@@ -2469,8 +2467,8 @@
         </p:nvSpPr>
         <p:spPr>
           <a:xfrm>
-            <a:off x="2152363" y="937578"/>
-            <a:ext cx="27002363" cy="3403813"/>
+            <a:off x="2869853" y="1666819"/>
+            <a:ext cx="36003607" cy="6051257"/>
           </a:xfrm>
           <a:prstGeom prst="rect">
             <a:avLst/>
@@ -2502,8 +2500,8 @@
         </p:nvSpPr>
         <p:spPr>
           <a:xfrm>
-            <a:off x="2152363" y="4687884"/>
-            <a:ext cx="27002363" cy="11173471"/>
+            <a:off x="2869853" y="8334063"/>
+            <a:ext cx="36003607" cy="19864060"/>
           </a:xfrm>
           <a:prstGeom prst="rect">
             <a:avLst/>
@@ -2564,8 +2562,8 @@
         </p:nvSpPr>
         <p:spPr>
           <a:xfrm>
-            <a:off x="2152362" y="16321990"/>
-            <a:ext cx="7044095" cy="937577"/>
+            <a:off x="2869853" y="29017039"/>
+            <a:ext cx="9392245" cy="1666813"/>
           </a:xfrm>
           <a:prstGeom prst="rect">
             <a:avLst/>
@@ -2575,7 +2573,7 @@
           <a:bodyPr vert="horz" lIns="91440" tIns="45720" rIns="91440" bIns="45720" rtlCol="0" anchor="ctr"/>
           <a:lstStyle>
             <a:lvl1pPr algn="l">
-              <a:defRPr sz="3081">
+              <a:defRPr sz="5478">
                 <a:solidFill>
                   <a:schemeClr val="tx1">
                     <a:tint val="75000"/>
@@ -2587,7 +2585,7 @@
           <a:p>
             <a:fld id="{486C7C19-CDD6-4A52-B0C8-0C80AAE84465}" type="datetimeFigureOut">
               <a:rPr lang="en-US" smtClean="0"/>
-              <a:t>26-May-21</a:t>
+              <a:t>27-May-21</a:t>
             </a:fld>
             <a:endParaRPr lang="en-US"/>
           </a:p>
@@ -2605,8 +2603,8 @@
         </p:nvSpPr>
         <p:spPr>
           <a:xfrm>
-            <a:off x="10370473" y="16321990"/>
-            <a:ext cx="10566142" cy="937577"/>
+            <a:off x="13827473" y="29017039"/>
+            <a:ext cx="14088368" cy="1666813"/>
           </a:xfrm>
           <a:prstGeom prst="rect">
             <a:avLst/>
@@ -2616,7 +2614,7 @@
           <a:bodyPr vert="horz" lIns="91440" tIns="45720" rIns="91440" bIns="45720" rtlCol="0" anchor="ctr"/>
           <a:lstStyle>
             <a:lvl1pPr algn="ctr">
-              <a:defRPr sz="3081">
+              <a:defRPr sz="5478">
                 <a:solidFill>
                   <a:schemeClr val="tx1">
                     <a:tint val="75000"/>
@@ -2642,8 +2640,8 @@
         </p:nvSpPr>
         <p:spPr>
           <a:xfrm>
-            <a:off x="22110631" y="16321990"/>
-            <a:ext cx="7044095" cy="937577"/>
+            <a:off x="29481215" y="29017039"/>
+            <a:ext cx="9392245" cy="1666813"/>
           </a:xfrm>
           <a:prstGeom prst="rect">
             <a:avLst/>
@@ -2653,7 +2651,7 @@
           <a:bodyPr vert="horz" lIns="91440" tIns="45720" rIns="91440" bIns="45720" rtlCol="0" anchor="ctr"/>
           <a:lstStyle>
             <a:lvl1pPr algn="r">
-              <a:defRPr sz="3081">
+              <a:defRPr sz="5478">
                 <a:solidFill>
                   <a:schemeClr val="tx1">
                     <a:tint val="75000"/>
@@ -2674,27 +2672,27 @@
     </p:spTree>
     <p:extLst>
       <p:ext uri="{BB962C8B-B14F-4D97-AF65-F5344CB8AC3E}">
-        <p14:creationId xmlns:p14="http://schemas.microsoft.com/office/powerpoint/2010/main" val="2972863031"/>
+        <p14:creationId xmlns:p14="http://schemas.microsoft.com/office/powerpoint/2010/main" val="2731265050"/>
       </p:ext>
     </p:extLst>
   </p:cSld>
   <p:clrMap bg1="lt1" tx1="dk1" bg2="lt2" tx2="dk2" accent1="accent1" accent2="accent2" accent3="accent3" accent4="accent4" accent5="accent5" accent6="accent6" hlink="hlink" folHlink="folHlink"/>
   <p:sldLayoutIdLst>
-    <p:sldLayoutId id="2147483757" r:id="rId1"/>
-    <p:sldLayoutId id="2147483758" r:id="rId2"/>
-    <p:sldLayoutId id="2147483759" r:id="rId3"/>
-    <p:sldLayoutId id="2147483760" r:id="rId4"/>
-    <p:sldLayoutId id="2147483761" r:id="rId5"/>
-    <p:sldLayoutId id="2147483762" r:id="rId6"/>
-    <p:sldLayoutId id="2147483763" r:id="rId7"/>
-    <p:sldLayoutId id="2147483764" r:id="rId8"/>
-    <p:sldLayoutId id="2147483765" r:id="rId9"/>
-    <p:sldLayoutId id="2147483766" r:id="rId10"/>
-    <p:sldLayoutId id="2147483767" r:id="rId11"/>
+    <p:sldLayoutId id="2147483781" r:id="rId1"/>
+    <p:sldLayoutId id="2147483782" r:id="rId2"/>
+    <p:sldLayoutId id="2147483783" r:id="rId3"/>
+    <p:sldLayoutId id="2147483784" r:id="rId4"/>
+    <p:sldLayoutId id="2147483785" r:id="rId5"/>
+    <p:sldLayoutId id="2147483786" r:id="rId6"/>
+    <p:sldLayoutId id="2147483787" r:id="rId7"/>
+    <p:sldLayoutId id="2147483788" r:id="rId8"/>
+    <p:sldLayoutId id="2147483789" r:id="rId9"/>
+    <p:sldLayoutId id="2147483790" r:id="rId10"/>
+    <p:sldLayoutId id="2147483791" r:id="rId11"/>
   </p:sldLayoutIdLst>
   <p:txStyles>
     <p:titleStyle>
-      <a:lvl1pPr algn="l" defTabSz="2347996" rtl="0" eaLnBrk="1" latinLnBrk="0" hangingPunct="1">
+      <a:lvl1pPr algn="l" defTabSz="4174236" rtl="0" eaLnBrk="1" latinLnBrk="0" hangingPunct="1">
         <a:lnSpc>
           <a:spcPct val="90000"/>
         </a:lnSpc>
@@ -2702,7 +2700,7 @@
           <a:spcPct val="0"/>
         </a:spcBef>
         <a:buNone/>
-        <a:defRPr sz="11298" kern="1200">
+        <a:defRPr sz="20086" kern="1200">
           <a:solidFill>
             <a:schemeClr val="tx1"/>
           </a:solidFill>
@@ -2713,16 +2711,16 @@
       </a:lvl1pPr>
     </p:titleStyle>
     <p:bodyStyle>
-      <a:lvl1pPr marL="586999" indent="-586999" algn="l" defTabSz="2347996" rtl="0" eaLnBrk="1" latinLnBrk="0" hangingPunct="1">
+      <a:lvl1pPr marL="1043559" indent="-1043559" algn="l" defTabSz="4174236" rtl="0" eaLnBrk="1" latinLnBrk="0" hangingPunct="1">
         <a:lnSpc>
           <a:spcPct val="90000"/>
         </a:lnSpc>
         <a:spcBef>
-          <a:spcPts val="2568"/>
+          <a:spcPts val="4565"/>
         </a:spcBef>
         <a:buFont typeface="Arial" panose="020B0604020202020204" pitchFamily="34" charset="0"/>
         <a:buChar char="•"/>
-        <a:defRPr sz="7190" kern="1200">
+        <a:defRPr sz="12782" kern="1200">
           <a:solidFill>
             <a:schemeClr val="tx1"/>
           </a:solidFill>
@@ -2731,16 +2729,16 @@
           <a:cs typeface="+mn-cs"/>
         </a:defRPr>
       </a:lvl1pPr>
-      <a:lvl2pPr marL="1760997" indent="-586999" algn="l" defTabSz="2347996" rtl="0" eaLnBrk="1" latinLnBrk="0" hangingPunct="1">
+      <a:lvl2pPr marL="3130677" indent="-1043559" algn="l" defTabSz="4174236" rtl="0" eaLnBrk="1" latinLnBrk="0" hangingPunct="1">
         <a:lnSpc>
           <a:spcPct val="90000"/>
         </a:lnSpc>
         <a:spcBef>
-          <a:spcPts val="1284"/>
+          <a:spcPts val="2283"/>
         </a:spcBef>
         <a:buFont typeface="Arial" panose="020B0604020202020204" pitchFamily="34" charset="0"/>
         <a:buChar char="•"/>
-        <a:defRPr sz="6163" kern="1200">
+        <a:defRPr sz="10956" kern="1200">
           <a:solidFill>
             <a:schemeClr val="tx1"/>
           </a:solidFill>
@@ -2749,16 +2747,16 @@
           <a:cs typeface="+mn-cs"/>
         </a:defRPr>
       </a:lvl2pPr>
-      <a:lvl3pPr marL="2934995" indent="-586999" algn="l" defTabSz="2347996" rtl="0" eaLnBrk="1" latinLnBrk="0" hangingPunct="1">
+      <a:lvl3pPr marL="5217795" indent="-1043559" algn="l" defTabSz="4174236" rtl="0" eaLnBrk="1" latinLnBrk="0" hangingPunct="1">
         <a:lnSpc>
           <a:spcPct val="90000"/>
         </a:lnSpc>
         <a:spcBef>
-          <a:spcPts val="1284"/>
+          <a:spcPts val="2283"/>
         </a:spcBef>
         <a:buFont typeface="Arial" panose="020B0604020202020204" pitchFamily="34" charset="0"/>
         <a:buChar char="•"/>
-        <a:defRPr sz="5136" kern="1200">
+        <a:defRPr sz="9130" kern="1200">
           <a:solidFill>
             <a:schemeClr val="tx1"/>
           </a:solidFill>
@@ -2767,16 +2765,16 @@
           <a:cs typeface="+mn-cs"/>
         </a:defRPr>
       </a:lvl3pPr>
-      <a:lvl4pPr marL="4108994" indent="-586999" algn="l" defTabSz="2347996" rtl="0" eaLnBrk="1" latinLnBrk="0" hangingPunct="1">
+      <a:lvl4pPr marL="7304913" indent="-1043559" algn="l" defTabSz="4174236" rtl="0" eaLnBrk="1" latinLnBrk="0" hangingPunct="1">
         <a:lnSpc>
           <a:spcPct val="90000"/>
         </a:lnSpc>
         <a:spcBef>
-          <a:spcPts val="1284"/>
+          <a:spcPts val="2283"/>
         </a:spcBef>
         <a:buFont typeface="Arial" panose="020B0604020202020204" pitchFamily="34" charset="0"/>
         <a:buChar char="•"/>
-        <a:defRPr sz="4622" kern="1200">
+        <a:defRPr sz="8217" kern="1200">
           <a:solidFill>
             <a:schemeClr val="tx1"/>
           </a:solidFill>
@@ -2785,16 +2783,16 @@
           <a:cs typeface="+mn-cs"/>
         </a:defRPr>
       </a:lvl4pPr>
-      <a:lvl5pPr marL="5282992" indent="-586999" algn="l" defTabSz="2347996" rtl="0" eaLnBrk="1" latinLnBrk="0" hangingPunct="1">
+      <a:lvl5pPr marL="9392031" indent="-1043559" algn="l" defTabSz="4174236" rtl="0" eaLnBrk="1" latinLnBrk="0" hangingPunct="1">
         <a:lnSpc>
           <a:spcPct val="90000"/>
         </a:lnSpc>
         <a:spcBef>
-          <a:spcPts val="1284"/>
+          <a:spcPts val="2283"/>
         </a:spcBef>
         <a:buFont typeface="Arial" panose="020B0604020202020204" pitchFamily="34" charset="0"/>
         <a:buChar char="•"/>
-        <a:defRPr sz="4622" kern="1200">
+        <a:defRPr sz="8217" kern="1200">
           <a:solidFill>
             <a:schemeClr val="tx1"/>
           </a:solidFill>
@@ -2803,16 +2801,16 @@
           <a:cs typeface="+mn-cs"/>
         </a:defRPr>
       </a:lvl5pPr>
-      <a:lvl6pPr marL="6456990" indent="-586999" algn="l" defTabSz="2347996" rtl="0" eaLnBrk="1" latinLnBrk="0" hangingPunct="1">
+      <a:lvl6pPr marL="11479149" indent="-1043559" algn="l" defTabSz="4174236" rtl="0" eaLnBrk="1" latinLnBrk="0" hangingPunct="1">
         <a:lnSpc>
           <a:spcPct val="90000"/>
         </a:lnSpc>
         <a:spcBef>
-          <a:spcPts val="1284"/>
+          <a:spcPts val="2283"/>
         </a:spcBef>
         <a:buFont typeface="Arial" panose="020B0604020202020204" pitchFamily="34" charset="0"/>
         <a:buChar char="•"/>
-        <a:defRPr sz="4622" kern="1200">
+        <a:defRPr sz="8217" kern="1200">
           <a:solidFill>
             <a:schemeClr val="tx1"/>
           </a:solidFill>
@@ -2821,16 +2819,16 @@
           <a:cs typeface="+mn-cs"/>
         </a:defRPr>
       </a:lvl6pPr>
-      <a:lvl7pPr marL="7630988" indent="-586999" algn="l" defTabSz="2347996" rtl="0" eaLnBrk="1" latinLnBrk="0" hangingPunct="1">
+      <a:lvl7pPr marL="13566267" indent="-1043559" algn="l" defTabSz="4174236" rtl="0" eaLnBrk="1" latinLnBrk="0" hangingPunct="1">
         <a:lnSpc>
           <a:spcPct val="90000"/>
         </a:lnSpc>
         <a:spcBef>
-          <a:spcPts val="1284"/>
+          <a:spcPts val="2283"/>
         </a:spcBef>
         <a:buFont typeface="Arial" panose="020B0604020202020204" pitchFamily="34" charset="0"/>
         <a:buChar char="•"/>
-        <a:defRPr sz="4622" kern="1200">
+        <a:defRPr sz="8217" kern="1200">
           <a:solidFill>
             <a:schemeClr val="tx1"/>
           </a:solidFill>
@@ -2839,16 +2837,16 @@
           <a:cs typeface="+mn-cs"/>
         </a:defRPr>
       </a:lvl7pPr>
-      <a:lvl8pPr marL="8804986" indent="-586999" algn="l" defTabSz="2347996" rtl="0" eaLnBrk="1" latinLnBrk="0" hangingPunct="1">
+      <a:lvl8pPr marL="15653385" indent="-1043559" algn="l" defTabSz="4174236" rtl="0" eaLnBrk="1" latinLnBrk="0" hangingPunct="1">
         <a:lnSpc>
           <a:spcPct val="90000"/>
         </a:lnSpc>
         <a:spcBef>
-          <a:spcPts val="1284"/>
+          <a:spcPts val="2283"/>
         </a:spcBef>
         <a:buFont typeface="Arial" panose="020B0604020202020204" pitchFamily="34" charset="0"/>
         <a:buChar char="•"/>
-        <a:defRPr sz="4622" kern="1200">
+        <a:defRPr sz="8217" kern="1200">
           <a:solidFill>
             <a:schemeClr val="tx1"/>
           </a:solidFill>
@@ -2857,16 +2855,16 @@
           <a:cs typeface="+mn-cs"/>
         </a:defRPr>
       </a:lvl8pPr>
-      <a:lvl9pPr marL="9978984" indent="-586999" algn="l" defTabSz="2347996" rtl="0" eaLnBrk="1" latinLnBrk="0" hangingPunct="1">
+      <a:lvl9pPr marL="17740503" indent="-1043559" algn="l" defTabSz="4174236" rtl="0" eaLnBrk="1" latinLnBrk="0" hangingPunct="1">
         <a:lnSpc>
           <a:spcPct val="90000"/>
         </a:lnSpc>
         <a:spcBef>
-          <a:spcPts val="1284"/>
+          <a:spcPts val="2283"/>
         </a:spcBef>
         <a:buFont typeface="Arial" panose="020B0604020202020204" pitchFamily="34" charset="0"/>
         <a:buChar char="•"/>
-        <a:defRPr sz="4622" kern="1200">
+        <a:defRPr sz="8217" kern="1200">
           <a:solidFill>
             <a:schemeClr val="tx1"/>
           </a:solidFill>
@@ -2880,8 +2878,8 @@
       <a:defPPr>
         <a:defRPr lang="en-US"/>
       </a:defPPr>
-      <a:lvl1pPr marL="0" algn="l" defTabSz="2347996" rtl="0" eaLnBrk="1" latinLnBrk="0" hangingPunct="1">
-        <a:defRPr sz="4622" kern="1200">
+      <a:lvl1pPr marL="0" algn="l" defTabSz="4174236" rtl="0" eaLnBrk="1" latinLnBrk="0" hangingPunct="1">
+        <a:defRPr sz="8217" kern="1200">
           <a:solidFill>
             <a:schemeClr val="tx1"/>
           </a:solidFill>
@@ -2890,8 +2888,8 @@
           <a:cs typeface="+mn-cs"/>
         </a:defRPr>
       </a:lvl1pPr>
-      <a:lvl2pPr marL="1173998" algn="l" defTabSz="2347996" rtl="0" eaLnBrk="1" latinLnBrk="0" hangingPunct="1">
-        <a:defRPr sz="4622" kern="1200">
+      <a:lvl2pPr marL="2087118" algn="l" defTabSz="4174236" rtl="0" eaLnBrk="1" latinLnBrk="0" hangingPunct="1">
+        <a:defRPr sz="8217" kern="1200">
           <a:solidFill>
             <a:schemeClr val="tx1"/>
           </a:solidFill>
@@ -2900,8 +2898,8 @@
           <a:cs typeface="+mn-cs"/>
         </a:defRPr>
       </a:lvl2pPr>
-      <a:lvl3pPr marL="2347996" algn="l" defTabSz="2347996" rtl="0" eaLnBrk="1" latinLnBrk="0" hangingPunct="1">
-        <a:defRPr sz="4622" kern="1200">
+      <a:lvl3pPr marL="4174236" algn="l" defTabSz="4174236" rtl="0" eaLnBrk="1" latinLnBrk="0" hangingPunct="1">
+        <a:defRPr sz="8217" kern="1200">
           <a:solidFill>
             <a:schemeClr val="tx1"/>
           </a:solidFill>
@@ -2910,8 +2908,8 @@
           <a:cs typeface="+mn-cs"/>
         </a:defRPr>
       </a:lvl3pPr>
-      <a:lvl4pPr marL="3521994" algn="l" defTabSz="2347996" rtl="0" eaLnBrk="1" latinLnBrk="0" hangingPunct="1">
-        <a:defRPr sz="4622" kern="1200">
+      <a:lvl4pPr marL="6261354" algn="l" defTabSz="4174236" rtl="0" eaLnBrk="1" latinLnBrk="0" hangingPunct="1">
+        <a:defRPr sz="8217" kern="1200">
           <a:solidFill>
             <a:schemeClr val="tx1"/>
           </a:solidFill>
@@ -2920,8 +2918,8 @@
           <a:cs typeface="+mn-cs"/>
         </a:defRPr>
       </a:lvl4pPr>
-      <a:lvl5pPr marL="4695993" algn="l" defTabSz="2347996" rtl="0" eaLnBrk="1" latinLnBrk="0" hangingPunct="1">
-        <a:defRPr sz="4622" kern="1200">
+      <a:lvl5pPr marL="8348472" algn="l" defTabSz="4174236" rtl="0" eaLnBrk="1" latinLnBrk="0" hangingPunct="1">
+        <a:defRPr sz="8217" kern="1200">
           <a:solidFill>
             <a:schemeClr val="tx1"/>
           </a:solidFill>
@@ -2930,8 +2928,8 @@
           <a:cs typeface="+mn-cs"/>
         </a:defRPr>
       </a:lvl5pPr>
-      <a:lvl6pPr marL="5869991" algn="l" defTabSz="2347996" rtl="0" eaLnBrk="1" latinLnBrk="0" hangingPunct="1">
-        <a:defRPr sz="4622" kern="1200">
+      <a:lvl6pPr marL="10435590" algn="l" defTabSz="4174236" rtl="0" eaLnBrk="1" latinLnBrk="0" hangingPunct="1">
+        <a:defRPr sz="8217" kern="1200">
           <a:solidFill>
             <a:schemeClr val="tx1"/>
           </a:solidFill>
@@ -2940,8 +2938,8 @@
           <a:cs typeface="+mn-cs"/>
         </a:defRPr>
       </a:lvl6pPr>
-      <a:lvl7pPr marL="7043989" algn="l" defTabSz="2347996" rtl="0" eaLnBrk="1" latinLnBrk="0" hangingPunct="1">
-        <a:defRPr sz="4622" kern="1200">
+      <a:lvl7pPr marL="12522708" algn="l" defTabSz="4174236" rtl="0" eaLnBrk="1" latinLnBrk="0" hangingPunct="1">
+        <a:defRPr sz="8217" kern="1200">
           <a:solidFill>
             <a:schemeClr val="tx1"/>
           </a:solidFill>
@@ -2950,8 +2948,8 @@
           <a:cs typeface="+mn-cs"/>
         </a:defRPr>
       </a:lvl7pPr>
-      <a:lvl8pPr marL="8217987" algn="l" defTabSz="2347996" rtl="0" eaLnBrk="1" latinLnBrk="0" hangingPunct="1">
-        <a:defRPr sz="4622" kern="1200">
+      <a:lvl8pPr marL="14609826" algn="l" defTabSz="4174236" rtl="0" eaLnBrk="1" latinLnBrk="0" hangingPunct="1">
+        <a:defRPr sz="8217" kern="1200">
           <a:solidFill>
             <a:schemeClr val="tx1"/>
           </a:solidFill>
@@ -2960,8 +2958,8 @@
           <a:cs typeface="+mn-cs"/>
         </a:defRPr>
       </a:lvl8pPr>
-      <a:lvl9pPr marL="9391985" algn="l" defTabSz="2347996" rtl="0" eaLnBrk="1" latinLnBrk="0" hangingPunct="1">
-        <a:defRPr sz="4622" kern="1200">
+      <a:lvl9pPr marL="16696944" algn="l" defTabSz="4174236" rtl="0" eaLnBrk="1" latinLnBrk="0" hangingPunct="1">
+        <a:defRPr sz="8217" kern="1200">
           <a:solidFill>
             <a:schemeClr val="tx1"/>
           </a:solidFill>
@@ -3014,8 +3012,8 @@
         </p:blipFill>
         <p:spPr>
           <a:xfrm>
-            <a:off x="-33819943" y="-33945304"/>
-            <a:ext cx="98946973" cy="26123290"/>
+            <a:off x="-1" y="20129161"/>
+            <a:ext cx="37376101" cy="10262653"/>
           </a:xfrm>
           <a:prstGeom prst="rect">
             <a:avLst/>
@@ -3044,8 +3042,8 @@
         </p:blipFill>
         <p:spPr>
           <a:xfrm>
-            <a:off x="-33819943" y="-22587682"/>
-            <a:ext cx="98946973" cy="26251234"/>
+            <a:off x="0" y="0"/>
+            <a:ext cx="37376102" cy="10262653"/>
           </a:xfrm>
           <a:prstGeom prst="rect">
             <a:avLst/>
@@ -3074,8 +3072,8 @@
         </p:blipFill>
         <p:spPr>
           <a:xfrm>
-            <a:off x="-33819943" y="7921523"/>
-            <a:ext cx="98946973" cy="27036437"/>
+            <a:off x="-3" y="10522217"/>
+            <a:ext cx="37376103" cy="10262653"/>
           </a:xfrm>
           <a:prstGeom prst="rect">
             <a:avLst/>
@@ -3084,10 +3082,10 @@
       </p:pic>
       <p:pic>
         <p:nvPicPr>
-          <p:cNvPr id="6" name="Picture 5">
+          <p:cNvPr id="2" name="Picture 1">
             <a:extLst>
               <a:ext uri="{FF2B5EF4-FFF2-40B4-BE49-F238E27FC236}">
-                <a16:creationId xmlns:a16="http://schemas.microsoft.com/office/drawing/2014/main" id="{BAB5BCFC-D6D6-44E3-B69F-B7B9049FCA5D}"/>
+                <a16:creationId xmlns:a16="http://schemas.microsoft.com/office/drawing/2014/main" id="{30A12E6E-78B8-4B05-BEF0-3939EE1EA695}"/>
               </a:ext>
             </a:extLst>
           </p:cNvPr>
@@ -3104,8 +3102,8 @@
         </p:blipFill>
         <p:spPr>
           <a:xfrm>
-            <a:off x="28006441" y="-10402789"/>
-            <a:ext cx="37120591" cy="6838719"/>
+            <a:off x="24174449" y="9077578"/>
+            <a:ext cx="13201651" cy="1444640"/>
           </a:xfrm>
           <a:prstGeom prst="rect">
             <a:avLst/>
@@ -3114,10 +3112,10 @@
       </p:pic>
       <p:pic>
         <p:nvPicPr>
-          <p:cNvPr id="20" name="Picture 19">
+          <p:cNvPr id="9" name="Picture 8">
             <a:extLst>
               <a:ext uri="{FF2B5EF4-FFF2-40B4-BE49-F238E27FC236}">
-                <a16:creationId xmlns:a16="http://schemas.microsoft.com/office/drawing/2014/main" id="{A48DCA9F-AF2F-421A-B59D-753F23ED3A1A}"/>
+                <a16:creationId xmlns:a16="http://schemas.microsoft.com/office/drawing/2014/main" id="{6FC2561C-BD54-482A-9910-96C68532479E}"/>
               </a:ext>
             </a:extLst>
           </p:cNvPr>
@@ -3134,8 +3132,8 @@
         </p:blipFill>
         <p:spPr>
           <a:xfrm>
-            <a:off x="28006445" y="244194"/>
-            <a:ext cx="37120591" cy="6838719"/>
+            <a:off x="24174448" y="19147276"/>
+            <a:ext cx="13201651" cy="1444640"/>
           </a:xfrm>
           <a:prstGeom prst="rect">
             <a:avLst/>
@@ -3144,10 +3142,10 @@
       </p:pic>
       <p:pic>
         <p:nvPicPr>
-          <p:cNvPr id="22" name="Picture 21">
+          <p:cNvPr id="10" name="Picture 9">
             <a:extLst>
               <a:ext uri="{FF2B5EF4-FFF2-40B4-BE49-F238E27FC236}">
-                <a16:creationId xmlns:a16="http://schemas.microsoft.com/office/drawing/2014/main" id="{0BFE3968-56C5-45F0-A6C9-5559CA1A9266}"/>
+                <a16:creationId xmlns:a16="http://schemas.microsoft.com/office/drawing/2014/main" id="{C15209EE-3B90-420A-AE91-FBEAEF0D31AC}"/>
               </a:ext>
             </a:extLst>
           </p:cNvPr>
@@ -3164,8 +3162,8 @@
         </p:blipFill>
         <p:spPr>
           <a:xfrm>
-            <a:off x="28006445" y="30748405"/>
-            <a:ext cx="37120591" cy="6838719"/>
+            <a:off x="24174447" y="29177740"/>
+            <a:ext cx="13201651" cy="1444640"/>
           </a:xfrm>
           <a:prstGeom prst="rect">
             <a:avLst/>
@@ -3230,8 +3228,8 @@
         </p:blipFill>
         <p:spPr>
           <a:xfrm>
-            <a:off x="-33195726" y="-14503365"/>
-            <a:ext cx="97698540" cy="51138135"/>
+            <a:off x="-65971980" y="-25783904"/>
+            <a:ext cx="173687272" cy="90912752"/>
           </a:xfrm>
           <a:prstGeom prst="rect">
             <a:avLst/>
@@ -3260,8 +3258,8 @@
         </p:blipFill>
         <p:spPr>
           <a:xfrm>
-            <a:off x="11699006" y="-14503394"/>
-            <a:ext cx="28315288" cy="1901029"/>
+            <a:off x="13841328" y="-25783957"/>
+            <a:ext cx="50338573" cy="3379626"/>
           </a:xfrm>
           <a:prstGeom prst="rect">
             <a:avLst/>
@@ -3282,8 +3280,8 @@
         </p:nvSpPr>
         <p:spPr>
           <a:xfrm>
-            <a:off x="304941" y="-14850468"/>
-            <a:ext cx="29839259" cy="1821909"/>
+            <a:off x="-6414903" y="-26400981"/>
+            <a:ext cx="52904676" cy="3167149"/>
           </a:xfrm>
           <a:prstGeom prst="rect">
             <a:avLst/>
@@ -3297,7 +3295,7 @@
           <a:lstStyle/>
           <a:p>
             <a:r>
-              <a:rPr lang="en-US" sz="11239" b="1" dirty="0"/>
+              <a:rPr lang="en-US" sz="19981" b="1" dirty="0"/>
               <a:t>Feature Importance – Gradient Boosting Classifier</a:t>
             </a:r>
           </a:p>
@@ -3361,8 +3359,8 @@
         </p:blipFill>
         <p:spPr>
           <a:xfrm>
-            <a:off x="-33819943" y="-14902410"/>
-            <a:ext cx="98946973" cy="51537147"/>
+            <a:off x="-67081705" y="-26493322"/>
+            <a:ext cx="175906721" cy="91622111"/>
           </a:xfrm>
           <a:prstGeom prst="rect">
             <a:avLst/>
@@ -3391,8 +3389,8 @@
         </p:blipFill>
         <p:spPr>
           <a:xfrm>
-            <a:off x="11699006" y="-14676945"/>
-            <a:ext cx="28315288" cy="1901029"/>
+            <a:off x="13841328" y="-26092494"/>
+            <a:ext cx="50338573" cy="3379626"/>
           </a:xfrm>
           <a:prstGeom prst="rect">
             <a:avLst/>
@@ -3413,8 +3411,8 @@
         </p:nvSpPr>
         <p:spPr>
           <a:xfrm>
-            <a:off x="5424373" y="-15644862"/>
-            <a:ext cx="19573372" cy="1821909"/>
+            <a:off x="2686362" y="-27813245"/>
+            <a:ext cx="34654615" cy="3167149"/>
           </a:xfrm>
           <a:prstGeom prst="rect">
             <a:avLst/>
@@ -3428,7 +3426,7 @@
           <a:lstStyle/>
           <a:p>
             <a:r>
-              <a:rPr lang="en-US" sz="11239" b="1" dirty="0"/>
+              <a:rPr lang="en-US" sz="19981" b="1" dirty="0"/>
               <a:t>Feature Importance – Light GBM</a:t>
             </a:r>
           </a:p>
@@ -3492,8 +3490,8 @@
         </p:blipFill>
         <p:spPr>
           <a:xfrm>
-            <a:off x="-3613120" y="-17073588"/>
-            <a:ext cx="38533392" cy="12783956"/>
+            <a:off x="-13380384" y="-30353216"/>
+            <a:ext cx="68504194" cy="22727161"/>
           </a:xfrm>
           <a:prstGeom prst="rect">
             <a:avLst/>
@@ -3528,8 +3526,8 @@
         </p:blipFill>
         <p:spPr>
           <a:xfrm>
-            <a:off x="-3613120" y="-1363072"/>
-            <a:ext cx="38533392" cy="12506222"/>
+            <a:off x="-13380384" y="-2423253"/>
+            <a:ext cx="68504194" cy="22233409"/>
           </a:xfrm>
           <a:prstGeom prst="rect">
             <a:avLst/>
@@ -3564,8 +3562,8 @@
         </p:blipFill>
         <p:spPr>
           <a:xfrm>
-            <a:off x="-3613120" y="14069665"/>
-            <a:ext cx="38533392" cy="12783956"/>
+            <a:off x="-13380384" y="25012879"/>
+            <a:ext cx="68504194" cy="22727161"/>
           </a:xfrm>
           <a:prstGeom prst="rect">
             <a:avLst/>
@@ -3586,8 +3584,8 @@
         </p:nvSpPr>
         <p:spPr>
           <a:xfrm>
-            <a:off x="12788483" y="-18468177"/>
-            <a:ext cx="4980979" cy="968407"/>
+            <a:off x="15778188" y="-32832500"/>
+            <a:ext cx="8720977" cy="1649811"/>
           </a:xfrm>
           <a:prstGeom prst="rect">
             <a:avLst/>
@@ -3601,7 +3599,7 @@
           <a:lstStyle/>
           <a:p>
             <a:r>
-              <a:rPr lang="en-US" sz="5693" b="1" dirty="0">
+              <a:rPr lang="en-US" sz="10121" b="1" dirty="0">
                 <a:solidFill>
                   <a:schemeClr val="tx1">
                     <a:lumMod val="75000"/>
@@ -3628,8 +3626,8 @@
         </p:nvSpPr>
         <p:spPr>
           <a:xfrm>
-            <a:off x="12459711" y="-2894964"/>
-            <a:ext cx="5648598" cy="968407"/>
+            <a:off x="15193701" y="-5146632"/>
+            <a:ext cx="9904571" cy="1649811"/>
           </a:xfrm>
           <a:prstGeom prst="rect">
             <a:avLst/>
@@ -3643,7 +3641,7 @@
           <a:lstStyle/>
           <a:p>
             <a:r>
-              <a:rPr lang="en-US" sz="5693" b="1" dirty="0">
+              <a:rPr lang="en-US" sz="10121" b="1" dirty="0">
                 <a:solidFill>
                   <a:schemeClr val="tx1">
                     <a:lumMod val="75000"/>
@@ -3670,8 +3668,8 @@
         </p:nvSpPr>
         <p:spPr>
           <a:xfrm>
-            <a:off x="13833253" y="12621490"/>
-            <a:ext cx="2765116" cy="968407"/>
+            <a:off x="17635567" y="22438332"/>
+            <a:ext cx="4771947" cy="1649811"/>
           </a:xfrm>
           <a:prstGeom prst="rect">
             <a:avLst/>
@@ -3685,7 +3683,7 @@
           <a:lstStyle/>
           <a:p>
             <a:r>
-              <a:rPr lang="en-US" sz="5693" b="1" dirty="0">
+              <a:rPr lang="en-US" sz="10121" b="1" dirty="0">
                 <a:solidFill>
                   <a:schemeClr val="tx1">
                     <a:lumMod val="75000"/>
@@ -3742,8 +3740,8 @@
         </p:nvSpPr>
         <p:spPr>
           <a:xfrm>
-            <a:off x="4621380" y="-1785379"/>
-            <a:ext cx="2393604" cy="968407"/>
+            <a:off x="-10807776" y="-3174025"/>
+            <a:ext cx="4110421" cy="1649811"/>
           </a:xfrm>
           <a:prstGeom prst="rect">
             <a:avLst/>
@@ -3757,7 +3755,7 @@
           <a:lstStyle/>
           <a:p>
             <a:r>
-              <a:rPr lang="en-US" sz="5693" dirty="0">
+              <a:rPr lang="en-US" sz="10121" dirty="0">
                 <a:solidFill>
                   <a:schemeClr val="tx1">
                     <a:lumMod val="75000"/>
@@ -3784,8 +3782,8 @@
         </p:nvSpPr>
         <p:spPr>
           <a:xfrm>
-            <a:off x="24399872" y="-1562267"/>
-            <a:ext cx="2397131" cy="968407"/>
+            <a:off x="48487359" y="-2777379"/>
+            <a:ext cx="4114588" cy="1649811"/>
           </a:xfrm>
           <a:prstGeom prst="rect">
             <a:avLst/>
@@ -3799,7 +3797,7 @@
           <a:lstStyle/>
           <a:p>
             <a:r>
-              <a:rPr lang="en-US" sz="5693" dirty="0">
+              <a:rPr lang="en-US" sz="10121" dirty="0">
                 <a:solidFill>
                   <a:schemeClr val="tx1">
                     <a:lumMod val="75000"/>
@@ -3826,8 +3824,8 @@
         </p:nvSpPr>
         <p:spPr>
           <a:xfrm>
-            <a:off x="13558972" y="8543529"/>
-            <a:ext cx="3781420" cy="968407"/>
+            <a:off x="17147953" y="15188583"/>
+            <a:ext cx="6576609" cy="1649811"/>
           </a:xfrm>
           <a:prstGeom prst="rect">
             <a:avLst/>
@@ -3841,7 +3839,7 @@
           <a:lstStyle/>
           <a:p>
             <a:r>
-              <a:rPr lang="en-US" sz="5693" dirty="0">
+              <a:rPr lang="en-US" sz="10121" dirty="0">
                 <a:solidFill>
                   <a:schemeClr val="tx1">
                     <a:lumMod val="75000"/>
@@ -3876,8 +3874,8 @@
         </p:blipFill>
         <p:spPr>
           <a:xfrm>
-            <a:off x="-3419951" y="-626808"/>
-            <a:ext cx="38054261" cy="458555"/>
+            <a:off x="-13036970" y="-1114331"/>
+            <a:ext cx="67652401" cy="815213"/>
           </a:xfrm>
           <a:prstGeom prst="rect">
             <a:avLst/>
@@ -3906,8 +3904,8 @@
         </p:blipFill>
         <p:spPr>
           <a:xfrm>
-            <a:off x="-3133967" y="7938499"/>
-            <a:ext cx="38054261" cy="458555"/>
+            <a:off x="-12528551" y="14112969"/>
+            <a:ext cx="67652401" cy="815213"/>
           </a:xfrm>
           <a:prstGeom prst="rect">
             <a:avLst/>
@@ -3936,8 +3934,8 @@
         </p:blipFill>
         <p:spPr>
           <a:xfrm>
-            <a:off x="-2693000" y="9790188"/>
-            <a:ext cx="38054261" cy="458555"/>
+            <a:off x="-11744605" y="17404879"/>
+            <a:ext cx="67652401" cy="815213"/>
           </a:xfrm>
           <a:prstGeom prst="rect">
             <a:avLst/>
@@ -3966,8 +3964,8 @@
         </p:blipFill>
         <p:spPr>
           <a:xfrm>
-            <a:off x="-3133967" y="18419150"/>
-            <a:ext cx="38054261" cy="458555"/>
+            <a:off x="-12528551" y="32745340"/>
+            <a:ext cx="67652401" cy="815213"/>
           </a:xfrm>
           <a:prstGeom prst="rect">
             <a:avLst/>
@@ -4002,8 +4000,8 @@
         </p:blipFill>
         <p:spPr>
           <a:xfrm>
-            <a:off x="-3613110" y="-569501"/>
-            <a:ext cx="18882281" cy="9374591"/>
+            <a:off x="-13380366" y="-1012451"/>
+            <a:ext cx="33568689" cy="16666033"/>
           </a:xfrm>
           <a:prstGeom prst="rect">
             <a:avLst/>
@@ -4038,8 +4036,8 @@
         </p:blipFill>
         <p:spPr>
           <a:xfrm>
-            <a:off x="16744444" y="-626781"/>
-            <a:ext cx="18175816" cy="9023843"/>
+            <a:off x="22811045" y="-1114283"/>
+            <a:ext cx="32312744" cy="16042478"/>
           </a:xfrm>
           <a:prstGeom prst="rect">
             <a:avLst/>
@@ -4074,8 +4072,8 @@
         </p:blipFill>
         <p:spPr>
           <a:xfrm>
-            <a:off x="6452001" y="10019473"/>
-            <a:ext cx="18882281" cy="9374583"/>
+            <a:off x="4513267" y="17812499"/>
+            <a:ext cx="33568689" cy="16666019"/>
           </a:xfrm>
           <a:prstGeom prst="rect">
             <a:avLst/>
@@ -4134,8 +4132,8 @@
         </p:blipFill>
         <p:spPr>
           <a:xfrm>
-            <a:off x="-6831832" y="-19023611"/>
-            <a:ext cx="34699355" cy="55657359"/>
+            <a:off x="-19102570" y="-33819943"/>
+            <a:ext cx="61688090" cy="98946973"/>
           </a:xfrm>
           <a:prstGeom prst="rect">
             <a:avLst/>
@@ -4194,8 +4192,8 @@
         </p:blipFill>
         <p:spPr>
           <a:xfrm>
-            <a:off x="-4655145" y="-18940603"/>
-            <a:ext cx="35089273" cy="55574352"/>
+            <a:off x="-15232882" y="-33672373"/>
+            <a:ext cx="62381281" cy="98799405"/>
           </a:xfrm>
           <a:prstGeom prst="rect">
             <a:avLst/>
@@ -4224,8 +4222,8 @@
         </p:blipFill>
         <p:spPr>
           <a:xfrm>
-            <a:off x="-5913624" y="-17060627"/>
-            <a:ext cx="36347751" cy="7862978"/>
+            <a:off x="-17470191" y="-30330174"/>
+            <a:ext cx="64618588" cy="13978706"/>
           </a:xfrm>
           <a:prstGeom prst="rect">
             <a:avLst/>
@@ -4254,8 +4252,8 @@
         </p:blipFill>
         <p:spPr>
           <a:xfrm>
-            <a:off x="-4655146" y="-11198288"/>
-            <a:ext cx="33818594" cy="2497451"/>
+            <a:off x="-15232885" y="-19908180"/>
+            <a:ext cx="60122284" cy="4439938"/>
           </a:xfrm>
           <a:prstGeom prst="rect">
             <a:avLst/>
@@ -4284,8 +4282,8 @@
         </p:blipFill>
         <p:spPr>
           <a:xfrm>
-            <a:off x="-5284384" y="-19071263"/>
-            <a:ext cx="36347751" cy="6107306"/>
+            <a:off x="-16351536" y="-33904659"/>
+            <a:ext cx="64618588" cy="10857494"/>
           </a:xfrm>
           <a:prstGeom prst="rect">
             <a:avLst/>
@@ -4336,8 +4334,8 @@
         </p:nvGrpSpPr>
         <p:grpSpPr>
           <a:xfrm>
-            <a:off x="0" y="470291"/>
-            <a:ext cx="15653544" cy="8334777"/>
+            <a:off x="-6957023" y="836079"/>
+            <a:ext cx="27828679" cy="14817465"/>
             <a:chOff x="0" y="-1133504"/>
             <a:chExt cx="31307088" cy="15250795"/>
           </a:xfrm>
@@ -4423,8 +4421,8 @@
         </p:nvGrpSpPr>
         <p:grpSpPr>
           <a:xfrm>
-            <a:off x="15653544" y="470291"/>
-            <a:ext cx="15653544" cy="8009597"/>
+            <a:off x="20871657" y="836078"/>
+            <a:ext cx="27828679" cy="14239364"/>
             <a:chOff x="0" y="-17967887"/>
             <a:chExt cx="30823790" cy="15250795"/>
           </a:xfrm>
@@ -4510,8 +4508,8 @@
         </p:nvGrpSpPr>
         <p:grpSpPr>
           <a:xfrm>
-            <a:off x="7220196" y="8511653"/>
-            <a:ext cx="16866696" cy="8953374"/>
+            <a:off x="5878953" y="15131914"/>
+            <a:ext cx="29985406" cy="15917199"/>
             <a:chOff x="1" y="15700879"/>
             <a:chExt cx="31199690" cy="15250795"/>
           </a:xfrm>
@@ -4641,8 +4639,8 @@
         </p:blipFill>
         <p:spPr>
           <a:xfrm>
-            <a:off x="-51570335" y="-11227244"/>
-            <a:ext cx="82877423" cy="55035793"/>
+            <a:off x="-98638135" y="-19959657"/>
+            <a:ext cx="147338471" cy="97841961"/>
           </a:xfrm>
           <a:prstGeom prst="rect">
             <a:avLst/>
@@ -4663,8 +4661,8 @@
         </p:nvSpPr>
         <p:spPr>
           <a:xfrm>
-            <a:off x="6073456" y="-6470295"/>
-            <a:ext cx="4538159" cy="1490142"/>
+            <a:off x="-8226294" y="-11502811"/>
+            <a:ext cx="8067884" cy="2649156"/>
           </a:xfrm>
           <a:prstGeom prst="rect">
             <a:avLst/>
@@ -4695,7 +4693,7 @@
           </a:fontRef>
         </p:style>
         <p:txBody>
-          <a:bodyPr rot="0" spcFirstLastPara="0" vertOverflow="overflow" horzOverflow="overflow" vert="horz" wrap="square" lIns="162561" tIns="81280" rIns="162561" bIns="81280" numCol="1" spcCol="0" rtlCol="0" fromWordArt="0" anchor="ctr" anchorCtr="0" forceAA="0" compatLnSpc="1">
+          <a:bodyPr rot="0" spcFirstLastPara="0" vertOverflow="overflow" horzOverflow="overflow" vert="horz" wrap="square" lIns="288999" tIns="144499" rIns="288999" bIns="144499" numCol="1" spcCol="0" rtlCol="0" fromWordArt="0" anchor="ctr" anchorCtr="0" forceAA="0" compatLnSpc="1">
             <a:prstTxWarp prst="textNoShape">
               <a:avLst/>
             </a:prstTxWarp>
@@ -4704,7 +4702,7 @@
           <a:lstStyle/>
           <a:p>
             <a:pPr algn="ctr"/>
-            <a:endParaRPr lang="en-US" sz="3200" dirty="0">
+            <a:endParaRPr lang="en-US" sz="5689" dirty="0">
               <a:solidFill>
                 <a:srgbClr val="FC2324"/>
               </a:solidFill>
@@ -4726,8 +4724,8 @@
         </p:nvSpPr>
         <p:spPr>
           <a:xfrm>
-            <a:off x="6073456" y="-3153084"/>
-            <a:ext cx="4538159" cy="1490142"/>
+            <a:off x="-8226294" y="-5605514"/>
+            <a:ext cx="8067884" cy="2649156"/>
           </a:xfrm>
           <a:prstGeom prst="rect">
             <a:avLst/>
@@ -4758,7 +4756,7 @@
           </a:fontRef>
         </p:style>
         <p:txBody>
-          <a:bodyPr rot="0" spcFirstLastPara="0" vertOverflow="overflow" horzOverflow="overflow" vert="horz" wrap="square" lIns="162561" tIns="81280" rIns="162561" bIns="81280" numCol="1" spcCol="0" rtlCol="0" fromWordArt="0" anchor="ctr" anchorCtr="0" forceAA="0" compatLnSpc="1">
+          <a:bodyPr rot="0" spcFirstLastPara="0" vertOverflow="overflow" horzOverflow="overflow" vert="horz" wrap="square" lIns="288999" tIns="144499" rIns="288999" bIns="144499" numCol="1" spcCol="0" rtlCol="0" fromWordArt="0" anchor="ctr" anchorCtr="0" forceAA="0" compatLnSpc="1">
             <a:prstTxWarp prst="textNoShape">
               <a:avLst/>
             </a:prstTxWarp>
@@ -4767,7 +4765,7 @@
           <a:lstStyle/>
           <a:p>
             <a:pPr algn="ctr"/>
-            <a:endParaRPr lang="en-US" sz="3200" dirty="0">
+            <a:endParaRPr lang="en-US" sz="5689" dirty="0">
               <a:solidFill>
                 <a:srgbClr val="FC2324"/>
               </a:solidFill>

</xml_diff>

<commit_message>
One of the more final versions
</commit_message>
<xml_diff>
--- a/Final Submission/Images/v4.pptx
+++ b/Final Submission/Images/v4.pptx
@@ -5,15 +5,16 @@
     <p:sldMasterId id="2147483780" r:id="rId1"/>
   </p:sldMasterIdLst>
   <p:sldIdLst>
-    <p:sldId id="260" r:id="rId2"/>
-    <p:sldId id="258" r:id="rId3"/>
-    <p:sldId id="259" r:id="rId4"/>
-    <p:sldId id="257" r:id="rId5"/>
-    <p:sldId id="256" r:id="rId6"/>
-    <p:sldId id="261" r:id="rId7"/>
-    <p:sldId id="262" r:id="rId8"/>
-    <p:sldId id="263" r:id="rId9"/>
-    <p:sldId id="264" r:id="rId10"/>
+    <p:sldId id="265" r:id="rId2"/>
+    <p:sldId id="260" r:id="rId3"/>
+    <p:sldId id="258" r:id="rId4"/>
+    <p:sldId id="259" r:id="rId5"/>
+    <p:sldId id="257" r:id="rId6"/>
+    <p:sldId id="256" r:id="rId7"/>
+    <p:sldId id="261" r:id="rId8"/>
+    <p:sldId id="262" r:id="rId9"/>
+    <p:sldId id="263" r:id="rId10"/>
+    <p:sldId id="264" r:id="rId11"/>
   </p:sldIdLst>
   <p:sldSz cx="41743313" cy="31307088"/>
   <p:notesSz cx="6858000" cy="9144000"/>
@@ -2992,10 +2993,10 @@
       </p:grpSpPr>
       <p:pic>
         <p:nvPicPr>
-          <p:cNvPr id="3" name="Picture 2">
+          <p:cNvPr id="2" name="Picture 1">
             <a:extLst>
               <a:ext uri="{FF2B5EF4-FFF2-40B4-BE49-F238E27FC236}">
-                <a16:creationId xmlns:a16="http://schemas.microsoft.com/office/drawing/2014/main" id="{1D003A4A-8169-49EB-9CB7-9F3DB1B042D2}"/>
+                <a16:creationId xmlns:a16="http://schemas.microsoft.com/office/drawing/2014/main" id="{30A12E6E-78B8-4B05-BEF0-3939EE1EA695}"/>
               </a:ext>
             </a:extLst>
           </p:cNvPr>
@@ -3012,8 +3013,8 @@
         </p:blipFill>
         <p:spPr>
           <a:xfrm>
-            <a:off x="-1" y="20129161"/>
-            <a:ext cx="37376101" cy="10262653"/>
+            <a:off x="24174449" y="9077578"/>
+            <a:ext cx="13201651" cy="1444640"/>
           </a:xfrm>
           <a:prstGeom prst="rect">
             <a:avLst/>
@@ -3022,10 +3023,70 @@
       </p:pic>
       <p:pic>
         <p:nvPicPr>
-          <p:cNvPr id="4" name="Picture 3">
+          <p:cNvPr id="9" name="Picture 8">
             <a:extLst>
               <a:ext uri="{FF2B5EF4-FFF2-40B4-BE49-F238E27FC236}">
-                <a16:creationId xmlns:a16="http://schemas.microsoft.com/office/drawing/2014/main" id="{0AA51B1C-0BF4-473C-9B69-F6CE0D3C9647}"/>
+                <a16:creationId xmlns:a16="http://schemas.microsoft.com/office/drawing/2014/main" id="{6FC2561C-BD54-482A-9910-96C68532479E}"/>
+              </a:ext>
+            </a:extLst>
+          </p:cNvPr>
+          <p:cNvPicPr>
+            <a:picLocks noChangeAspect="1"/>
+          </p:cNvPicPr>
+          <p:nvPr/>
+        </p:nvPicPr>
+        <p:blipFill>
+          <a:blip r:embed="rId2"/>
+          <a:stretch>
+            <a:fillRect/>
+          </a:stretch>
+        </p:blipFill>
+        <p:spPr>
+          <a:xfrm>
+            <a:off x="24174448" y="19147276"/>
+            <a:ext cx="13201651" cy="1444640"/>
+          </a:xfrm>
+          <a:prstGeom prst="rect">
+            <a:avLst/>
+          </a:prstGeom>
+        </p:spPr>
+      </p:pic>
+      <p:pic>
+        <p:nvPicPr>
+          <p:cNvPr id="10" name="Picture 9">
+            <a:extLst>
+              <a:ext uri="{FF2B5EF4-FFF2-40B4-BE49-F238E27FC236}">
+                <a16:creationId xmlns:a16="http://schemas.microsoft.com/office/drawing/2014/main" id="{C15209EE-3B90-420A-AE91-FBEAEF0D31AC}"/>
+              </a:ext>
+            </a:extLst>
+          </p:cNvPr>
+          <p:cNvPicPr>
+            <a:picLocks noChangeAspect="1"/>
+          </p:cNvPicPr>
+          <p:nvPr/>
+        </p:nvPicPr>
+        <p:blipFill>
+          <a:blip r:embed="rId2"/>
+          <a:stretch>
+            <a:fillRect/>
+          </a:stretch>
+        </p:blipFill>
+        <p:spPr>
+          <a:xfrm>
+            <a:off x="24174447" y="29177740"/>
+            <a:ext cx="13201651" cy="1444640"/>
+          </a:xfrm>
+          <a:prstGeom prst="rect">
+            <a:avLst/>
+          </a:prstGeom>
+        </p:spPr>
+      </p:pic>
+      <p:pic>
+        <p:nvPicPr>
+          <p:cNvPr id="6" name="Picture 5">
+            <a:extLst>
+              <a:ext uri="{FF2B5EF4-FFF2-40B4-BE49-F238E27FC236}">
+                <a16:creationId xmlns:a16="http://schemas.microsoft.com/office/drawing/2014/main" id="{C843B18C-E0C7-4D16-8D6C-5C7E2D97F134}"/>
               </a:ext>
             </a:extLst>
           </p:cNvPr>
@@ -3043,7 +3104,7 @@
         <p:spPr>
           <a:xfrm>
             <a:off x="0" y="0"/>
-            <a:ext cx="37376102" cy="10262653"/>
+            <a:ext cx="36170131" cy="9715500"/>
           </a:xfrm>
           <a:prstGeom prst="rect">
             <a:avLst/>
@@ -3052,10 +3113,10 @@
       </p:pic>
       <p:pic>
         <p:nvPicPr>
-          <p:cNvPr id="5" name="Picture 4">
+          <p:cNvPr id="7" name="Picture 6">
             <a:extLst>
               <a:ext uri="{FF2B5EF4-FFF2-40B4-BE49-F238E27FC236}">
-                <a16:creationId xmlns:a16="http://schemas.microsoft.com/office/drawing/2014/main" id="{7587C29F-FB39-4B61-9A03-7C24B9D20C43}"/>
+                <a16:creationId xmlns:a16="http://schemas.microsoft.com/office/drawing/2014/main" id="{3B3F37E2-06A2-4911-9A83-BF7E18DA7F5C}"/>
               </a:ext>
             </a:extLst>
           </p:cNvPr>
@@ -3072,8 +3133,8 @@
         </p:blipFill>
         <p:spPr>
           <a:xfrm>
-            <a:off x="-3" y="10522217"/>
-            <a:ext cx="37376103" cy="10262653"/>
+            <a:off x="0" y="10522218"/>
+            <a:ext cx="36170130" cy="9431776"/>
           </a:xfrm>
           <a:prstGeom prst="rect">
             <a:avLst/>
@@ -3082,10 +3143,10 @@
       </p:pic>
       <p:pic>
         <p:nvPicPr>
-          <p:cNvPr id="2" name="Picture 1">
+          <p:cNvPr id="8" name="Picture 7">
             <a:extLst>
               <a:ext uri="{FF2B5EF4-FFF2-40B4-BE49-F238E27FC236}">
-                <a16:creationId xmlns:a16="http://schemas.microsoft.com/office/drawing/2014/main" id="{30A12E6E-78B8-4B05-BEF0-3939EE1EA695}"/>
+                <a16:creationId xmlns:a16="http://schemas.microsoft.com/office/drawing/2014/main" id="{30EAF9F3-9296-4751-A186-0C35EF26542D}"/>
               </a:ext>
             </a:extLst>
           </p:cNvPr>
@@ -3102,8 +3163,8 @@
         </p:blipFill>
         <p:spPr>
           <a:xfrm>
-            <a:off x="24174449" y="9077578"/>
-            <a:ext cx="13201651" cy="1444640"/>
+            <a:off x="0" y="20168941"/>
+            <a:ext cx="36170130" cy="9431775"/>
           </a:xfrm>
           <a:prstGeom prst="rect">
             <a:avLst/>
@@ -3112,10 +3173,10 @@
       </p:pic>
       <p:pic>
         <p:nvPicPr>
-          <p:cNvPr id="9" name="Picture 8">
+          <p:cNvPr id="11" name="Picture 10">
             <a:extLst>
               <a:ext uri="{FF2B5EF4-FFF2-40B4-BE49-F238E27FC236}">
-                <a16:creationId xmlns:a16="http://schemas.microsoft.com/office/drawing/2014/main" id="{6FC2561C-BD54-482A-9910-96C68532479E}"/>
+                <a16:creationId xmlns:a16="http://schemas.microsoft.com/office/drawing/2014/main" id="{878E4E3F-37CC-4EFD-86CD-4142242BDB95}"/>
               </a:ext>
             </a:extLst>
           </p:cNvPr>
@@ -3125,15 +3186,15 @@
           <p:nvPr/>
         </p:nvPicPr>
         <p:blipFill>
-          <a:blip r:embed="rId5"/>
+          <a:blip r:embed="rId6"/>
           <a:stretch>
             <a:fillRect/>
           </a:stretch>
         </p:blipFill>
         <p:spPr>
           <a:xfrm>
-            <a:off x="24174448" y="19147276"/>
-            <a:ext cx="13201651" cy="1444640"/>
+            <a:off x="23488649" y="8732485"/>
+            <a:ext cx="12681481" cy="1828968"/>
           </a:xfrm>
           <a:prstGeom prst="rect">
             <a:avLst/>
@@ -3142,10 +3203,10 @@
       </p:pic>
       <p:pic>
         <p:nvPicPr>
-          <p:cNvPr id="10" name="Picture 9">
+          <p:cNvPr id="12" name="Picture 11">
             <a:extLst>
               <a:ext uri="{FF2B5EF4-FFF2-40B4-BE49-F238E27FC236}">
-                <a16:creationId xmlns:a16="http://schemas.microsoft.com/office/drawing/2014/main" id="{C15209EE-3B90-420A-AE91-FBEAEF0D31AC}"/>
+                <a16:creationId xmlns:a16="http://schemas.microsoft.com/office/drawing/2014/main" id="{86D861CA-A5AF-4F82-8DDB-00759E2DA92C}"/>
               </a:ext>
             </a:extLst>
           </p:cNvPr>
@@ -3155,15 +3216,45 @@
           <p:nvPr/>
         </p:nvPicPr>
         <p:blipFill>
-          <a:blip r:embed="rId5"/>
+          <a:blip r:embed="rId6"/>
           <a:stretch>
             <a:fillRect/>
           </a:stretch>
         </p:blipFill>
         <p:spPr>
           <a:xfrm>
-            <a:off x="24174447" y="29177740"/>
-            <a:ext cx="13201651" cy="1444640"/>
+            <a:off x="23488648" y="18916668"/>
+            <a:ext cx="12681481" cy="1828968"/>
+          </a:xfrm>
+          <a:prstGeom prst="rect">
+            <a:avLst/>
+          </a:prstGeom>
+        </p:spPr>
+      </p:pic>
+      <p:pic>
+        <p:nvPicPr>
+          <p:cNvPr id="13" name="Picture 12">
+            <a:extLst>
+              <a:ext uri="{FF2B5EF4-FFF2-40B4-BE49-F238E27FC236}">
+                <a16:creationId xmlns:a16="http://schemas.microsoft.com/office/drawing/2014/main" id="{F3FBD68B-30ED-49D1-AEC0-6B941F3EBF9E}"/>
+              </a:ext>
+            </a:extLst>
+          </p:cNvPr>
+          <p:cNvPicPr>
+            <a:picLocks noChangeAspect="1"/>
+          </p:cNvPicPr>
+          <p:nvPr/>
+        </p:nvPicPr>
+        <p:blipFill>
+          <a:blip r:embed="rId6"/>
+          <a:stretch>
+            <a:fillRect/>
+          </a:stretch>
+        </p:blipFill>
+        <p:spPr>
+          <a:xfrm>
+            <a:off x="22968476" y="28234362"/>
+            <a:ext cx="13201651" cy="1828968"/>
           </a:xfrm>
           <a:prstGeom prst="rect">
             <a:avLst/>
@@ -3173,7 +3264,199 @@
     </p:spTree>
     <p:extLst>
       <p:ext uri="{BB962C8B-B14F-4D97-AF65-F5344CB8AC3E}">
-        <p14:creationId xmlns:p14="http://schemas.microsoft.com/office/powerpoint/2010/main" val="3768733551"/>
+        <p14:creationId xmlns:p14="http://schemas.microsoft.com/office/powerpoint/2010/main" val="2624493244"/>
+      </p:ext>
+    </p:extLst>
+  </p:cSld>
+  <p:clrMapOvr>
+    <a:masterClrMapping/>
+  </p:clrMapOvr>
+</p:sld>
+</file>
+
+<file path=ppt/slides/slide10.xml><?xml version="1.0" encoding="utf-8"?>
+<p:sld xmlns:a="http://schemas.openxmlformats.org/drawingml/2006/main" xmlns:r="http://schemas.openxmlformats.org/officeDocument/2006/relationships" xmlns:p="http://schemas.openxmlformats.org/presentationml/2006/main">
+  <p:cSld>
+    <p:spTree>
+      <p:nvGrpSpPr>
+        <p:cNvPr id="1" name=""/>
+        <p:cNvGrpSpPr/>
+        <p:nvPr/>
+      </p:nvGrpSpPr>
+      <p:grpSpPr>
+        <a:xfrm>
+          <a:off x="0" y="0"/>
+          <a:ext cx="0" cy="0"/>
+          <a:chOff x="0" y="0"/>
+          <a:chExt cx="0" cy="0"/>
+        </a:xfrm>
+      </p:grpSpPr>
+      <p:pic>
+        <p:nvPicPr>
+          <p:cNvPr id="4" name="Picture 3">
+            <a:extLst>
+              <a:ext uri="{FF2B5EF4-FFF2-40B4-BE49-F238E27FC236}">
+                <a16:creationId xmlns:a16="http://schemas.microsoft.com/office/drawing/2014/main" id="{6E22E914-C92B-4502-B0BA-E16ABF7C0888}"/>
+              </a:ext>
+            </a:extLst>
+          </p:cNvPr>
+          <p:cNvPicPr>
+            <a:picLocks noChangeAspect="1"/>
+          </p:cNvPicPr>
+          <p:nvPr/>
+        </p:nvPicPr>
+        <p:blipFill>
+          <a:blip r:embed="rId2">
+            <a:extLst>
+              <a:ext uri="{28A0092B-C50C-407E-A947-70E740481C1C}">
+                <a14:useLocalDpi xmlns:a14="http://schemas.microsoft.com/office/drawing/2010/main" val="0"/>
+              </a:ext>
+            </a:extLst>
+          </a:blip>
+          <a:stretch>
+            <a:fillRect/>
+          </a:stretch>
+        </p:blipFill>
+        <p:spPr>
+          <a:xfrm>
+            <a:off x="-98638135" y="-19959657"/>
+            <a:ext cx="147338471" cy="97841961"/>
+          </a:xfrm>
+          <a:prstGeom prst="rect">
+            <a:avLst/>
+          </a:prstGeom>
+        </p:spPr>
+      </p:pic>
+      <p:sp>
+        <p:nvSpPr>
+          <p:cNvPr id="7" name="Rectangle 6">
+            <a:extLst>
+              <a:ext uri="{FF2B5EF4-FFF2-40B4-BE49-F238E27FC236}">
+                <a16:creationId xmlns:a16="http://schemas.microsoft.com/office/drawing/2014/main" id="{EA3BE075-3365-4A2F-AEC1-75A7D916E0D0}"/>
+              </a:ext>
+            </a:extLst>
+          </p:cNvPr>
+          <p:cNvSpPr/>
+          <p:nvPr/>
+        </p:nvSpPr>
+        <p:spPr>
+          <a:xfrm>
+            <a:off x="-8226294" y="-11502811"/>
+            <a:ext cx="8067884" cy="2649156"/>
+          </a:xfrm>
+          <a:prstGeom prst="rect">
+            <a:avLst/>
+          </a:prstGeom>
+          <a:solidFill>
+            <a:srgbClr val="FB1E1F"/>
+          </a:solidFill>
+          <a:ln>
+            <a:solidFill>
+              <a:schemeClr val="bg1"/>
+            </a:solidFill>
+          </a:ln>
+        </p:spPr>
+        <p:style>
+          <a:lnRef idx="2">
+            <a:schemeClr val="accent1">
+              <a:shade val="50000"/>
+            </a:schemeClr>
+          </a:lnRef>
+          <a:fillRef idx="1">
+            <a:schemeClr val="accent1"/>
+          </a:fillRef>
+          <a:effectRef idx="0">
+            <a:schemeClr val="accent1"/>
+          </a:effectRef>
+          <a:fontRef idx="minor">
+            <a:schemeClr val="lt1"/>
+          </a:fontRef>
+        </p:style>
+        <p:txBody>
+          <a:bodyPr rot="0" spcFirstLastPara="0" vertOverflow="overflow" horzOverflow="overflow" vert="horz" wrap="square" lIns="288999" tIns="144499" rIns="288999" bIns="144499" numCol="1" spcCol="0" rtlCol="0" fromWordArt="0" anchor="ctr" anchorCtr="0" forceAA="0" compatLnSpc="1">
+            <a:prstTxWarp prst="textNoShape">
+              <a:avLst/>
+            </a:prstTxWarp>
+            <a:noAutofit/>
+          </a:bodyPr>
+          <a:lstStyle/>
+          <a:p>
+            <a:pPr algn="ctr"/>
+            <a:endParaRPr lang="en-US" sz="5689" dirty="0">
+              <a:solidFill>
+                <a:srgbClr val="FC2324"/>
+              </a:solidFill>
+            </a:endParaRPr>
+          </a:p>
+        </p:txBody>
+      </p:sp>
+      <p:sp>
+        <p:nvSpPr>
+          <p:cNvPr id="9" name="Rectangle 8">
+            <a:extLst>
+              <a:ext uri="{FF2B5EF4-FFF2-40B4-BE49-F238E27FC236}">
+                <a16:creationId xmlns:a16="http://schemas.microsoft.com/office/drawing/2014/main" id="{299DAE4F-2657-465E-A7C4-CEFCF84C127D}"/>
+              </a:ext>
+            </a:extLst>
+          </p:cNvPr>
+          <p:cNvSpPr/>
+          <p:nvPr/>
+        </p:nvSpPr>
+        <p:spPr>
+          <a:xfrm>
+            <a:off x="-8226294" y="-5605514"/>
+            <a:ext cx="8067884" cy="2649156"/>
+          </a:xfrm>
+          <a:prstGeom prst="rect">
+            <a:avLst/>
+          </a:prstGeom>
+          <a:solidFill>
+            <a:srgbClr val="6262F9"/>
+          </a:solidFill>
+          <a:ln>
+            <a:solidFill>
+              <a:schemeClr val="bg1"/>
+            </a:solidFill>
+          </a:ln>
+        </p:spPr>
+        <p:style>
+          <a:lnRef idx="2">
+            <a:schemeClr val="accent1">
+              <a:shade val="50000"/>
+            </a:schemeClr>
+          </a:lnRef>
+          <a:fillRef idx="1">
+            <a:schemeClr val="accent1"/>
+          </a:fillRef>
+          <a:effectRef idx="0">
+            <a:schemeClr val="accent1"/>
+          </a:effectRef>
+          <a:fontRef idx="minor">
+            <a:schemeClr val="lt1"/>
+          </a:fontRef>
+        </p:style>
+        <p:txBody>
+          <a:bodyPr rot="0" spcFirstLastPara="0" vertOverflow="overflow" horzOverflow="overflow" vert="horz" wrap="square" lIns="288999" tIns="144499" rIns="288999" bIns="144499" numCol="1" spcCol="0" rtlCol="0" fromWordArt="0" anchor="ctr" anchorCtr="0" forceAA="0" compatLnSpc="1">
+            <a:prstTxWarp prst="textNoShape">
+              <a:avLst/>
+            </a:prstTxWarp>
+            <a:noAutofit/>
+          </a:bodyPr>
+          <a:lstStyle/>
+          <a:p>
+            <a:pPr algn="ctr"/>
+            <a:endParaRPr lang="en-US" sz="5689" dirty="0">
+              <a:solidFill>
+                <a:srgbClr val="FC2324"/>
+              </a:solidFill>
+            </a:endParaRPr>
+          </a:p>
+        </p:txBody>
+      </p:sp>
+    </p:spTree>
+    <p:extLst>
+      <p:ext uri="{BB962C8B-B14F-4D97-AF65-F5344CB8AC3E}">
+        <p14:creationId xmlns:p14="http://schemas.microsoft.com/office/powerpoint/2010/main" val="3183363762"/>
       </p:ext>
     </p:extLst>
   </p:cSld>
@@ -3202,10 +3485,10 @@
       </p:grpSpPr>
       <p:pic>
         <p:nvPicPr>
-          <p:cNvPr id="5" name="Picture 4">
+          <p:cNvPr id="3" name="Picture 2">
             <a:extLst>
               <a:ext uri="{FF2B5EF4-FFF2-40B4-BE49-F238E27FC236}">
-                <a16:creationId xmlns:a16="http://schemas.microsoft.com/office/drawing/2014/main" id="{E26C2159-C4B9-4ACB-8E52-3F80D8E21802}"/>
+                <a16:creationId xmlns:a16="http://schemas.microsoft.com/office/drawing/2014/main" id="{1D003A4A-8169-49EB-9CB7-9F3DB1B042D2}"/>
               </a:ext>
             </a:extLst>
           </p:cNvPr>
@@ -3215,21 +3498,15 @@
           <p:nvPr/>
         </p:nvPicPr>
         <p:blipFill>
-          <a:blip r:embed="rId2">
-            <a:extLst>
-              <a:ext uri="{28A0092B-C50C-407E-A947-70E740481C1C}">
-                <a14:useLocalDpi xmlns:a14="http://schemas.microsoft.com/office/drawing/2010/main" val="0"/>
-              </a:ext>
-            </a:extLst>
-          </a:blip>
+          <a:blip r:embed="rId2"/>
           <a:stretch>
             <a:fillRect/>
           </a:stretch>
         </p:blipFill>
         <p:spPr>
           <a:xfrm>
-            <a:off x="-65971980" y="-25783904"/>
-            <a:ext cx="173687272" cy="90912752"/>
+            <a:off x="-1" y="20129161"/>
+            <a:ext cx="37376101" cy="10262653"/>
           </a:xfrm>
           <a:prstGeom prst="rect">
             <a:avLst/>
@@ -3238,10 +3515,10 @@
       </p:pic>
       <p:pic>
         <p:nvPicPr>
-          <p:cNvPr id="7" name="Picture 6">
+          <p:cNvPr id="4" name="Picture 3">
             <a:extLst>
               <a:ext uri="{FF2B5EF4-FFF2-40B4-BE49-F238E27FC236}">
-                <a16:creationId xmlns:a16="http://schemas.microsoft.com/office/drawing/2014/main" id="{9BF58738-BAF2-4777-906A-22EF61D4490C}"/>
+                <a16:creationId xmlns:a16="http://schemas.microsoft.com/office/drawing/2014/main" id="{0AA51B1C-0BF4-473C-9B69-F6CE0D3C9647}"/>
               </a:ext>
             </a:extLst>
           </p:cNvPr>
@@ -3258,53 +3535,138 @@
         </p:blipFill>
         <p:spPr>
           <a:xfrm>
-            <a:off x="13841328" y="-25783957"/>
-            <a:ext cx="50338573" cy="3379626"/>
+            <a:off x="-8572500" y="14111615"/>
+            <a:ext cx="37376102" cy="10262653"/>
           </a:xfrm>
           <a:prstGeom prst="rect">
             <a:avLst/>
           </a:prstGeom>
         </p:spPr>
       </p:pic>
-      <p:sp>
-        <p:nvSpPr>
-          <p:cNvPr id="6" name="TextBox 5">
+      <p:pic>
+        <p:nvPicPr>
+          <p:cNvPr id="5" name="Picture 4">
             <a:extLst>
               <a:ext uri="{FF2B5EF4-FFF2-40B4-BE49-F238E27FC236}">
-                <a16:creationId xmlns:a16="http://schemas.microsoft.com/office/drawing/2014/main" id="{B1C0F630-393E-4DF7-A2FC-DBA7226C9AF1}"/>
+                <a16:creationId xmlns:a16="http://schemas.microsoft.com/office/drawing/2014/main" id="{7587C29F-FB39-4B61-9A03-7C24B9D20C43}"/>
               </a:ext>
             </a:extLst>
           </p:cNvPr>
-          <p:cNvSpPr txBox="1"/>
+          <p:cNvPicPr>
+            <a:picLocks noChangeAspect="1"/>
+          </p:cNvPicPr>
           <p:nvPr/>
-        </p:nvSpPr>
-        <p:spPr>
-          <a:xfrm>
-            <a:off x="-6414903" y="-26400981"/>
-            <a:ext cx="52904676" cy="3167149"/>
+        </p:nvPicPr>
+        <p:blipFill>
+          <a:blip r:embed="rId4"/>
+          <a:stretch>
+            <a:fillRect/>
+          </a:stretch>
+        </p:blipFill>
+        <p:spPr>
+          <a:xfrm>
+            <a:off x="2183604" y="21145597"/>
+            <a:ext cx="37376103" cy="10262653"/>
           </a:xfrm>
           <a:prstGeom prst="rect">
             <a:avLst/>
           </a:prstGeom>
-          <a:noFill/>
-        </p:spPr>
-        <p:txBody>
-          <a:bodyPr wrap="none" rtlCol="0">
-            <a:spAutoFit/>
-          </a:bodyPr>
-          <a:lstStyle/>
-          <a:p>
-            <a:r>
-              <a:rPr lang="en-US" sz="19981" b="1" dirty="0"/>
-              <a:t>Feature Importance – Gradient Boosting Classifier</a:t>
-            </a:r>
-          </a:p>
-        </p:txBody>
-      </p:sp>
+        </p:spPr>
+      </p:pic>
+      <p:pic>
+        <p:nvPicPr>
+          <p:cNvPr id="2" name="Picture 1">
+            <a:extLst>
+              <a:ext uri="{FF2B5EF4-FFF2-40B4-BE49-F238E27FC236}">
+                <a16:creationId xmlns:a16="http://schemas.microsoft.com/office/drawing/2014/main" id="{30A12E6E-78B8-4B05-BEF0-3939EE1EA695}"/>
+              </a:ext>
+            </a:extLst>
+          </p:cNvPr>
+          <p:cNvPicPr>
+            <a:picLocks noChangeAspect="1"/>
+          </p:cNvPicPr>
+          <p:nvPr/>
+        </p:nvPicPr>
+        <p:blipFill>
+          <a:blip r:embed="rId5"/>
+          <a:stretch>
+            <a:fillRect/>
+          </a:stretch>
+        </p:blipFill>
+        <p:spPr>
+          <a:xfrm>
+            <a:off x="24174449" y="9077578"/>
+            <a:ext cx="13201651" cy="1444640"/>
+          </a:xfrm>
+          <a:prstGeom prst="rect">
+            <a:avLst/>
+          </a:prstGeom>
+        </p:spPr>
+      </p:pic>
+      <p:pic>
+        <p:nvPicPr>
+          <p:cNvPr id="9" name="Picture 8">
+            <a:extLst>
+              <a:ext uri="{FF2B5EF4-FFF2-40B4-BE49-F238E27FC236}">
+                <a16:creationId xmlns:a16="http://schemas.microsoft.com/office/drawing/2014/main" id="{6FC2561C-BD54-482A-9910-96C68532479E}"/>
+              </a:ext>
+            </a:extLst>
+          </p:cNvPr>
+          <p:cNvPicPr>
+            <a:picLocks noChangeAspect="1"/>
+          </p:cNvPicPr>
+          <p:nvPr/>
+        </p:nvPicPr>
+        <p:blipFill>
+          <a:blip r:embed="rId5"/>
+          <a:stretch>
+            <a:fillRect/>
+          </a:stretch>
+        </p:blipFill>
+        <p:spPr>
+          <a:xfrm>
+            <a:off x="24174448" y="19147276"/>
+            <a:ext cx="13201651" cy="1444640"/>
+          </a:xfrm>
+          <a:prstGeom prst="rect">
+            <a:avLst/>
+          </a:prstGeom>
+        </p:spPr>
+      </p:pic>
+      <p:pic>
+        <p:nvPicPr>
+          <p:cNvPr id="10" name="Picture 9">
+            <a:extLst>
+              <a:ext uri="{FF2B5EF4-FFF2-40B4-BE49-F238E27FC236}">
+                <a16:creationId xmlns:a16="http://schemas.microsoft.com/office/drawing/2014/main" id="{C15209EE-3B90-420A-AE91-FBEAEF0D31AC}"/>
+              </a:ext>
+            </a:extLst>
+          </p:cNvPr>
+          <p:cNvPicPr>
+            <a:picLocks noChangeAspect="1"/>
+          </p:cNvPicPr>
+          <p:nvPr/>
+        </p:nvPicPr>
+        <p:blipFill>
+          <a:blip r:embed="rId5"/>
+          <a:stretch>
+            <a:fillRect/>
+          </a:stretch>
+        </p:blipFill>
+        <p:spPr>
+          <a:xfrm>
+            <a:off x="24174447" y="29177740"/>
+            <a:ext cx="13201651" cy="1444640"/>
+          </a:xfrm>
+          <a:prstGeom prst="rect">
+            <a:avLst/>
+          </a:prstGeom>
+        </p:spPr>
+      </p:pic>
     </p:spTree>
     <p:extLst>
       <p:ext uri="{BB962C8B-B14F-4D97-AF65-F5344CB8AC3E}">
-        <p14:creationId xmlns:p14="http://schemas.microsoft.com/office/powerpoint/2010/main" val="3179815928"/>
+        <p14:creationId xmlns:p14="http://schemas.microsoft.com/office/powerpoint/2010/main" val="3768733551"/>
       </p:ext>
     </p:extLst>
   </p:cSld>
@@ -3333,10 +3695,10 @@
       </p:grpSpPr>
       <p:pic>
         <p:nvPicPr>
-          <p:cNvPr id="3" name="Picture 2">
+          <p:cNvPr id="5" name="Picture 4">
             <a:extLst>
               <a:ext uri="{FF2B5EF4-FFF2-40B4-BE49-F238E27FC236}">
-                <a16:creationId xmlns:a16="http://schemas.microsoft.com/office/drawing/2014/main" id="{6CC98B5C-A3FD-4697-8491-3017C38BBA53}"/>
+                <a16:creationId xmlns:a16="http://schemas.microsoft.com/office/drawing/2014/main" id="{E26C2159-C4B9-4ACB-8E52-3F80D8E21802}"/>
               </a:ext>
             </a:extLst>
           </p:cNvPr>
@@ -3359,8 +3721,8 @@
         </p:blipFill>
         <p:spPr>
           <a:xfrm>
-            <a:off x="-67081705" y="-26493322"/>
-            <a:ext cx="175906721" cy="91622111"/>
+            <a:off x="-65971980" y="-25783904"/>
+            <a:ext cx="173687272" cy="90912752"/>
           </a:xfrm>
           <a:prstGeom prst="rect">
             <a:avLst/>
@@ -3389,7 +3751,7 @@
         </p:blipFill>
         <p:spPr>
           <a:xfrm>
-            <a:off x="13841328" y="-26092494"/>
+            <a:off x="13841328" y="-25783957"/>
             <a:ext cx="50338573" cy="3379626"/>
           </a:xfrm>
           <a:prstGeom prst="rect">
@@ -3411,8 +3773,8 @@
         </p:nvSpPr>
         <p:spPr>
           <a:xfrm>
-            <a:off x="2686362" y="-27813245"/>
-            <a:ext cx="34654615" cy="3167149"/>
+            <a:off x="-6414903" y="-26400981"/>
+            <a:ext cx="52904676" cy="3167149"/>
           </a:xfrm>
           <a:prstGeom prst="rect">
             <a:avLst/>
@@ -3427,7 +3789,7 @@
           <a:p>
             <a:r>
               <a:rPr lang="en-US" sz="19981" b="1" dirty="0"/>
-              <a:t>Feature Importance – Light GBM</a:t>
+              <a:t>Feature Importance – Gradient Boosting Classifier</a:t>
             </a:r>
           </a:p>
         </p:txBody>
@@ -3435,7 +3797,7 @@
     </p:spTree>
     <p:extLst>
       <p:ext uri="{BB962C8B-B14F-4D97-AF65-F5344CB8AC3E}">
-        <p14:creationId xmlns:p14="http://schemas.microsoft.com/office/powerpoint/2010/main" val="493021039"/>
+        <p14:creationId xmlns:p14="http://schemas.microsoft.com/office/powerpoint/2010/main" val="3179815928"/>
       </p:ext>
     </p:extLst>
   </p:cSld>
@@ -3464,10 +3826,10 @@
       </p:grpSpPr>
       <p:pic>
         <p:nvPicPr>
-          <p:cNvPr id="5" name="Picture 4">
+          <p:cNvPr id="3" name="Picture 2">
             <a:extLst>
               <a:ext uri="{FF2B5EF4-FFF2-40B4-BE49-F238E27FC236}">
-                <a16:creationId xmlns:a16="http://schemas.microsoft.com/office/drawing/2014/main" id="{1E47D71B-BC45-4EDE-80FC-F27EC560A8F1}"/>
+                <a16:creationId xmlns:a16="http://schemas.microsoft.com/office/drawing/2014/main" id="{6CC98B5C-A3FD-4697-8491-3017C38BBA53}"/>
               </a:ext>
             </a:extLst>
           </p:cNvPr>
@@ -3490,8 +3852,8 @@
         </p:blipFill>
         <p:spPr>
           <a:xfrm>
-            <a:off x="-13380384" y="-30353216"/>
-            <a:ext cx="68504194" cy="22727161"/>
+            <a:off x="-67081705" y="-26493322"/>
+            <a:ext cx="175906721" cy="91622111"/>
           </a:xfrm>
           <a:prstGeom prst="rect">
             <a:avLst/>
@@ -3503,7 +3865,7 @@
           <p:cNvPr id="7" name="Picture 6">
             <a:extLst>
               <a:ext uri="{FF2B5EF4-FFF2-40B4-BE49-F238E27FC236}">
-                <a16:creationId xmlns:a16="http://schemas.microsoft.com/office/drawing/2014/main" id="{B0E1DCB3-D084-4DE0-A195-C0B447D183FF}"/>
+                <a16:creationId xmlns:a16="http://schemas.microsoft.com/office/drawing/2014/main" id="{9BF58738-BAF2-4777-906A-22EF61D4490C}"/>
               </a:ext>
             </a:extLst>
           </p:cNvPr>
@@ -3513,69 +3875,27 @@
           <p:nvPr/>
         </p:nvPicPr>
         <p:blipFill>
-          <a:blip r:embed="rId3">
-            <a:extLst>
-              <a:ext uri="{28A0092B-C50C-407E-A947-70E740481C1C}">
-                <a14:useLocalDpi xmlns:a14="http://schemas.microsoft.com/office/drawing/2010/main" val="0"/>
-              </a:ext>
-            </a:extLst>
-          </a:blip>
+          <a:blip r:embed="rId3"/>
           <a:stretch>
             <a:fillRect/>
           </a:stretch>
         </p:blipFill>
         <p:spPr>
           <a:xfrm>
-            <a:off x="-13380384" y="-2423253"/>
-            <a:ext cx="68504194" cy="22233409"/>
+            <a:off x="13841328" y="-26092494"/>
+            <a:ext cx="50338573" cy="3379626"/>
           </a:xfrm>
           <a:prstGeom prst="rect">
             <a:avLst/>
           </a:prstGeom>
         </p:spPr>
       </p:pic>
-      <p:pic>
-        <p:nvPicPr>
-          <p:cNvPr id="9" name="Picture 8">
+      <p:sp>
+        <p:nvSpPr>
+          <p:cNvPr id="6" name="TextBox 5">
             <a:extLst>
               <a:ext uri="{FF2B5EF4-FFF2-40B4-BE49-F238E27FC236}">
-                <a16:creationId xmlns:a16="http://schemas.microsoft.com/office/drawing/2014/main" id="{99B2B67A-A16E-48B3-A2AE-A9B9291F4AF0}"/>
-              </a:ext>
-            </a:extLst>
-          </p:cNvPr>
-          <p:cNvPicPr>
-            <a:picLocks noChangeAspect="1"/>
-          </p:cNvPicPr>
-          <p:nvPr/>
-        </p:nvPicPr>
-        <p:blipFill>
-          <a:blip r:embed="rId4">
-            <a:extLst>
-              <a:ext uri="{28A0092B-C50C-407E-A947-70E740481C1C}">
-                <a14:useLocalDpi xmlns:a14="http://schemas.microsoft.com/office/drawing/2010/main" val="0"/>
-              </a:ext>
-            </a:extLst>
-          </a:blip>
-          <a:stretch>
-            <a:fillRect/>
-          </a:stretch>
-        </p:blipFill>
-        <p:spPr>
-          <a:xfrm>
-            <a:off x="-13380384" y="25012879"/>
-            <a:ext cx="68504194" cy="22727161"/>
-          </a:xfrm>
-          <a:prstGeom prst="rect">
-            <a:avLst/>
-          </a:prstGeom>
-        </p:spPr>
-      </p:pic>
-      <p:sp>
-        <p:nvSpPr>
-          <p:cNvPr id="10" name="TextBox 9">
-            <a:extLst>
-              <a:ext uri="{FF2B5EF4-FFF2-40B4-BE49-F238E27FC236}">
-                <a16:creationId xmlns:a16="http://schemas.microsoft.com/office/drawing/2014/main" id="{6099606E-91C4-4E25-9591-55C27E16DDC7}"/>
+                <a16:creationId xmlns:a16="http://schemas.microsoft.com/office/drawing/2014/main" id="{B1C0F630-393E-4DF7-A2FC-DBA7226C9AF1}"/>
               </a:ext>
             </a:extLst>
           </p:cNvPr>
@@ -3584,8 +3904,8 @@
         </p:nvSpPr>
         <p:spPr>
           <a:xfrm>
-            <a:off x="15778188" y="-32832500"/>
-            <a:ext cx="8720977" cy="1649811"/>
+            <a:off x="2686362" y="-27813245"/>
+            <a:ext cx="34654615" cy="3167149"/>
           </a:xfrm>
           <a:prstGeom prst="rect">
             <a:avLst/>
@@ -3599,99 +3919,8 @@
           <a:lstStyle/>
           <a:p>
             <a:r>
-              <a:rPr lang="en-US" sz="10121" b="1" dirty="0">
-                <a:solidFill>
-                  <a:schemeClr val="tx1">
-                    <a:lumMod val="75000"/>
-                    <a:lumOff val="25000"/>
-                  </a:schemeClr>
-                </a:solidFill>
-              </a:rPr>
-              <a:t>Internet Service</a:t>
-            </a:r>
-          </a:p>
-        </p:txBody>
-      </p:sp>
-      <p:sp>
-        <p:nvSpPr>
-          <p:cNvPr id="11" name="TextBox 10">
-            <a:extLst>
-              <a:ext uri="{FF2B5EF4-FFF2-40B4-BE49-F238E27FC236}">
-                <a16:creationId xmlns:a16="http://schemas.microsoft.com/office/drawing/2014/main" id="{C8B4CDC9-8641-4E39-ABB2-2B72C29D2E63}"/>
-              </a:ext>
-            </a:extLst>
-          </p:cNvPr>
-          <p:cNvSpPr txBox="1"/>
-          <p:nvPr/>
-        </p:nvSpPr>
-        <p:spPr>
-          <a:xfrm>
-            <a:off x="15193701" y="-5146632"/>
-            <a:ext cx="9904571" cy="1649811"/>
-          </a:xfrm>
-          <a:prstGeom prst="rect">
-            <a:avLst/>
-          </a:prstGeom>
-          <a:noFill/>
-        </p:spPr>
-        <p:txBody>
-          <a:bodyPr wrap="none" rtlCol="0">
-            <a:spAutoFit/>
-          </a:bodyPr>
-          <a:lstStyle/>
-          <a:p>
-            <a:r>
-              <a:rPr lang="en-US" sz="10121" b="1" dirty="0">
-                <a:solidFill>
-                  <a:schemeClr val="tx1">
-                    <a:lumMod val="75000"/>
-                    <a:lumOff val="25000"/>
-                  </a:schemeClr>
-                </a:solidFill>
-              </a:rPr>
-              <a:t>Streaming Movies</a:t>
-            </a:r>
-          </a:p>
-        </p:txBody>
-      </p:sp>
-      <p:sp>
-        <p:nvSpPr>
-          <p:cNvPr id="12" name="TextBox 11">
-            <a:extLst>
-              <a:ext uri="{FF2B5EF4-FFF2-40B4-BE49-F238E27FC236}">
-                <a16:creationId xmlns:a16="http://schemas.microsoft.com/office/drawing/2014/main" id="{6A5A1B23-3A42-425C-BD36-5D8743D2F4F0}"/>
-              </a:ext>
-            </a:extLst>
-          </p:cNvPr>
-          <p:cNvSpPr txBox="1"/>
-          <p:nvPr/>
-        </p:nvSpPr>
-        <p:spPr>
-          <a:xfrm>
-            <a:off x="17635567" y="22438332"/>
-            <a:ext cx="4771947" cy="1649811"/>
-          </a:xfrm>
-          <a:prstGeom prst="rect">
-            <a:avLst/>
-          </a:prstGeom>
-          <a:noFill/>
-        </p:spPr>
-        <p:txBody>
-          <a:bodyPr wrap="none" rtlCol="0">
-            <a:spAutoFit/>
-          </a:bodyPr>
-          <a:lstStyle/>
-          <a:p>
-            <a:r>
-              <a:rPr lang="en-US" sz="10121" b="1" dirty="0">
-                <a:solidFill>
-                  <a:schemeClr val="tx1">
-                    <a:lumMod val="75000"/>
-                    <a:lumOff val="25000"/>
-                  </a:schemeClr>
-                </a:solidFill>
-              </a:rPr>
-              <a:t>Contract</a:t>
+              <a:rPr lang="en-US" sz="19981" b="1" dirty="0"/>
+              <a:t>Feature Importance – Light GBM</a:t>
             </a:r>
           </a:p>
         </p:txBody>
@@ -3699,7 +3928,7 @@
     </p:spTree>
     <p:extLst>
       <p:ext uri="{BB962C8B-B14F-4D97-AF65-F5344CB8AC3E}">
-        <p14:creationId xmlns:p14="http://schemas.microsoft.com/office/powerpoint/2010/main" val="2420009140"/>
+        <p14:creationId xmlns:p14="http://schemas.microsoft.com/office/powerpoint/2010/main" val="493021039"/>
       </p:ext>
     </p:extLst>
   </p:cSld>
@@ -3726,138 +3955,12 @@
           <a:chExt cx="0" cy="0"/>
         </a:xfrm>
       </p:grpSpPr>
-      <p:sp>
-        <p:nvSpPr>
-          <p:cNvPr id="12" name="TextBox 11">
-            <a:extLst>
-              <a:ext uri="{FF2B5EF4-FFF2-40B4-BE49-F238E27FC236}">
-                <a16:creationId xmlns:a16="http://schemas.microsoft.com/office/drawing/2014/main" id="{AEF18B07-97E9-4957-A7F2-82BFF98CD549}"/>
-              </a:ext>
-            </a:extLst>
-          </p:cNvPr>
-          <p:cNvSpPr txBox="1"/>
-          <p:nvPr/>
-        </p:nvSpPr>
-        <p:spPr>
-          <a:xfrm>
-            <a:off x="-10807776" y="-3174025"/>
-            <a:ext cx="4110421" cy="1649811"/>
-          </a:xfrm>
-          <a:prstGeom prst="rect">
-            <a:avLst/>
-          </a:prstGeom>
-          <a:noFill/>
-        </p:spPr>
-        <p:txBody>
-          <a:bodyPr wrap="none" rtlCol="0">
-            <a:spAutoFit/>
-          </a:bodyPr>
-          <a:lstStyle/>
-          <a:p>
-            <a:r>
-              <a:rPr lang="en-US" sz="10121" dirty="0">
-                <a:solidFill>
-                  <a:schemeClr val="tx1">
-                    <a:lumMod val="75000"/>
-                    <a:lumOff val="25000"/>
-                  </a:schemeClr>
-                </a:solidFill>
-              </a:rPr>
-              <a:t>Gender</a:t>
-            </a:r>
-          </a:p>
-        </p:txBody>
-      </p:sp>
-      <p:sp>
-        <p:nvSpPr>
-          <p:cNvPr id="13" name="TextBox 12">
-            <a:extLst>
-              <a:ext uri="{FF2B5EF4-FFF2-40B4-BE49-F238E27FC236}">
-                <a16:creationId xmlns:a16="http://schemas.microsoft.com/office/drawing/2014/main" id="{FBF64AD6-C4DF-49ED-BC8F-3EA23861C5E2}"/>
-              </a:ext>
-            </a:extLst>
-          </p:cNvPr>
-          <p:cNvSpPr txBox="1"/>
-          <p:nvPr/>
-        </p:nvSpPr>
-        <p:spPr>
-          <a:xfrm>
-            <a:off x="48487359" y="-2777379"/>
-            <a:ext cx="4114588" cy="1649811"/>
-          </a:xfrm>
-          <a:prstGeom prst="rect">
-            <a:avLst/>
-          </a:prstGeom>
-          <a:noFill/>
-        </p:spPr>
-        <p:txBody>
-          <a:bodyPr wrap="none" rtlCol="0">
-            <a:spAutoFit/>
-          </a:bodyPr>
-          <a:lstStyle/>
-          <a:p>
-            <a:r>
-              <a:rPr lang="en-US" sz="10121" dirty="0">
-                <a:solidFill>
-                  <a:schemeClr val="tx1">
-                    <a:lumMod val="75000"/>
-                    <a:lumOff val="25000"/>
-                  </a:schemeClr>
-                </a:solidFill>
-              </a:rPr>
-              <a:t>Partner</a:t>
-            </a:r>
-          </a:p>
-        </p:txBody>
-      </p:sp>
-      <p:sp>
-        <p:nvSpPr>
-          <p:cNvPr id="15" name="TextBox 14">
-            <a:extLst>
-              <a:ext uri="{FF2B5EF4-FFF2-40B4-BE49-F238E27FC236}">
-                <a16:creationId xmlns:a16="http://schemas.microsoft.com/office/drawing/2014/main" id="{FEA00364-59C7-4F97-9634-D4816EE44F5A}"/>
-              </a:ext>
-            </a:extLst>
-          </p:cNvPr>
-          <p:cNvSpPr txBox="1"/>
-          <p:nvPr/>
-        </p:nvSpPr>
-        <p:spPr>
-          <a:xfrm>
-            <a:off x="17147953" y="15188583"/>
-            <a:ext cx="6576609" cy="1649811"/>
-          </a:xfrm>
-          <a:prstGeom prst="rect">
-            <a:avLst/>
-          </a:prstGeom>
-          <a:noFill/>
-        </p:spPr>
-        <p:txBody>
-          <a:bodyPr wrap="none" rtlCol="0">
-            <a:spAutoFit/>
-          </a:bodyPr>
-          <a:lstStyle/>
-          <a:p>
-            <a:r>
-              <a:rPr lang="en-US" sz="10121" dirty="0">
-                <a:solidFill>
-                  <a:schemeClr val="tx1">
-                    <a:lumMod val="75000"/>
-                    <a:lumOff val="25000"/>
-                  </a:schemeClr>
-                </a:solidFill>
-              </a:rPr>
-              <a:t>Dependents</a:t>
-            </a:r>
-          </a:p>
-        </p:txBody>
-      </p:sp>
       <p:pic>
         <p:nvPicPr>
-          <p:cNvPr id="16" name="Picture 15">
+          <p:cNvPr id="5" name="Picture 4">
             <a:extLst>
               <a:ext uri="{FF2B5EF4-FFF2-40B4-BE49-F238E27FC236}">
-                <a16:creationId xmlns:a16="http://schemas.microsoft.com/office/drawing/2014/main" id="{99EF5F77-FEA5-4293-B306-DFDDA21FBF70}"/>
+                <a16:creationId xmlns:a16="http://schemas.microsoft.com/office/drawing/2014/main" id="{1E47D71B-BC45-4EDE-80FC-F27EC560A8F1}"/>
               </a:ext>
             </a:extLst>
           </p:cNvPr>
@@ -3867,15 +3970,21 @@
           <p:nvPr/>
         </p:nvPicPr>
         <p:blipFill>
-          <a:blip r:embed="rId2"/>
+          <a:blip r:embed="rId2">
+            <a:extLst>
+              <a:ext uri="{28A0092B-C50C-407E-A947-70E740481C1C}">
+                <a14:useLocalDpi xmlns:a14="http://schemas.microsoft.com/office/drawing/2010/main" val="0"/>
+              </a:ext>
+            </a:extLst>
+          </a:blip>
           <a:stretch>
             <a:fillRect/>
           </a:stretch>
         </p:blipFill>
         <p:spPr>
           <a:xfrm>
-            <a:off x="-13036970" y="-1114331"/>
-            <a:ext cx="67652401" cy="815213"/>
+            <a:off x="-13380384" y="-30353216"/>
+            <a:ext cx="68504194" cy="22727161"/>
           </a:xfrm>
           <a:prstGeom prst="rect">
             <a:avLst/>
@@ -3884,100 +3993,10 @@
       </p:pic>
       <p:pic>
         <p:nvPicPr>
-          <p:cNvPr id="17" name="Picture 16">
+          <p:cNvPr id="7" name="Picture 6">
             <a:extLst>
               <a:ext uri="{FF2B5EF4-FFF2-40B4-BE49-F238E27FC236}">
-                <a16:creationId xmlns:a16="http://schemas.microsoft.com/office/drawing/2014/main" id="{3B94BCCE-629F-4DD1-9BCA-BE4BF99BF0B1}"/>
-              </a:ext>
-            </a:extLst>
-          </p:cNvPr>
-          <p:cNvPicPr>
-            <a:picLocks noChangeAspect="1"/>
-          </p:cNvPicPr>
-          <p:nvPr/>
-        </p:nvPicPr>
-        <p:blipFill>
-          <a:blip r:embed="rId2"/>
-          <a:stretch>
-            <a:fillRect/>
-          </a:stretch>
-        </p:blipFill>
-        <p:spPr>
-          <a:xfrm>
-            <a:off x="-12528551" y="14112969"/>
-            <a:ext cx="67652401" cy="815213"/>
-          </a:xfrm>
-          <a:prstGeom prst="rect">
-            <a:avLst/>
-          </a:prstGeom>
-        </p:spPr>
-      </p:pic>
-      <p:pic>
-        <p:nvPicPr>
-          <p:cNvPr id="18" name="Picture 17">
-            <a:extLst>
-              <a:ext uri="{FF2B5EF4-FFF2-40B4-BE49-F238E27FC236}">
-                <a16:creationId xmlns:a16="http://schemas.microsoft.com/office/drawing/2014/main" id="{B57E42C6-F104-4884-A4E9-0AA5050B17D1}"/>
-              </a:ext>
-            </a:extLst>
-          </p:cNvPr>
-          <p:cNvPicPr>
-            <a:picLocks noChangeAspect="1"/>
-          </p:cNvPicPr>
-          <p:nvPr/>
-        </p:nvPicPr>
-        <p:blipFill>
-          <a:blip r:embed="rId2"/>
-          <a:stretch>
-            <a:fillRect/>
-          </a:stretch>
-        </p:blipFill>
-        <p:spPr>
-          <a:xfrm>
-            <a:off x="-11744605" y="17404879"/>
-            <a:ext cx="67652401" cy="815213"/>
-          </a:xfrm>
-          <a:prstGeom prst="rect">
-            <a:avLst/>
-          </a:prstGeom>
-        </p:spPr>
-      </p:pic>
-      <p:pic>
-        <p:nvPicPr>
-          <p:cNvPr id="19" name="Picture 18">
-            <a:extLst>
-              <a:ext uri="{FF2B5EF4-FFF2-40B4-BE49-F238E27FC236}">
-                <a16:creationId xmlns:a16="http://schemas.microsoft.com/office/drawing/2014/main" id="{C325B4C8-3A85-425B-80B2-23434C936A7F}"/>
-              </a:ext>
-            </a:extLst>
-          </p:cNvPr>
-          <p:cNvPicPr>
-            <a:picLocks noChangeAspect="1"/>
-          </p:cNvPicPr>
-          <p:nvPr/>
-        </p:nvPicPr>
-        <p:blipFill>
-          <a:blip r:embed="rId2"/>
-          <a:stretch>
-            <a:fillRect/>
-          </a:stretch>
-        </p:blipFill>
-        <p:spPr>
-          <a:xfrm>
-            <a:off x="-12528551" y="32745340"/>
-            <a:ext cx="67652401" cy="815213"/>
-          </a:xfrm>
-          <a:prstGeom prst="rect">
-            <a:avLst/>
-          </a:prstGeom>
-        </p:spPr>
-      </p:pic>
-      <p:pic>
-        <p:nvPicPr>
-          <p:cNvPr id="21" name="Picture 20">
-            <a:extLst>
-              <a:ext uri="{FF2B5EF4-FFF2-40B4-BE49-F238E27FC236}">
-                <a16:creationId xmlns:a16="http://schemas.microsoft.com/office/drawing/2014/main" id="{7D6D816F-B3B5-47CA-80D3-356E8F9B2285}"/>
+                <a16:creationId xmlns:a16="http://schemas.microsoft.com/office/drawing/2014/main" id="{B0E1DCB3-D084-4DE0-A195-C0B447D183FF}"/>
               </a:ext>
             </a:extLst>
           </p:cNvPr>
@@ -4000,8 +4019,8 @@
         </p:blipFill>
         <p:spPr>
           <a:xfrm>
-            <a:off x="-13380366" y="-1012451"/>
-            <a:ext cx="33568689" cy="16666033"/>
+            <a:off x="-13380384" y="-2423253"/>
+            <a:ext cx="68504194" cy="22233409"/>
           </a:xfrm>
           <a:prstGeom prst="rect">
             <a:avLst/>
@@ -4010,10 +4029,10 @@
       </p:pic>
       <p:pic>
         <p:nvPicPr>
-          <p:cNvPr id="23" name="Picture 22">
+          <p:cNvPr id="9" name="Picture 8">
             <a:extLst>
               <a:ext uri="{FF2B5EF4-FFF2-40B4-BE49-F238E27FC236}">
-                <a16:creationId xmlns:a16="http://schemas.microsoft.com/office/drawing/2014/main" id="{FED83B2B-3F95-42B0-B0FB-A88F84CA3B4D}"/>
+                <a16:creationId xmlns:a16="http://schemas.microsoft.com/office/drawing/2014/main" id="{99B2B67A-A16E-48B3-A2AE-A9B9291F4AF0}"/>
               </a:ext>
             </a:extLst>
           </p:cNvPr>
@@ -4036,54 +4055,144 @@
         </p:blipFill>
         <p:spPr>
           <a:xfrm>
-            <a:off x="22811045" y="-1114283"/>
-            <a:ext cx="32312744" cy="16042478"/>
+            <a:off x="-13380384" y="25012879"/>
+            <a:ext cx="68504194" cy="22727161"/>
           </a:xfrm>
           <a:prstGeom prst="rect">
             <a:avLst/>
           </a:prstGeom>
         </p:spPr>
       </p:pic>
-      <p:pic>
-        <p:nvPicPr>
-          <p:cNvPr id="25" name="Picture 24">
+      <p:sp>
+        <p:nvSpPr>
+          <p:cNvPr id="10" name="TextBox 9">
             <a:extLst>
               <a:ext uri="{FF2B5EF4-FFF2-40B4-BE49-F238E27FC236}">
-                <a16:creationId xmlns:a16="http://schemas.microsoft.com/office/drawing/2014/main" id="{63708039-D06A-4F3D-B808-A2CC6C3D8AFC}"/>
+                <a16:creationId xmlns:a16="http://schemas.microsoft.com/office/drawing/2014/main" id="{6099606E-91C4-4E25-9591-55C27E16DDC7}"/>
               </a:ext>
             </a:extLst>
           </p:cNvPr>
-          <p:cNvPicPr>
-            <a:picLocks noChangeAspect="1"/>
-          </p:cNvPicPr>
+          <p:cNvSpPr txBox="1"/>
           <p:nvPr/>
-        </p:nvPicPr>
-        <p:blipFill>
-          <a:blip r:embed="rId5">
-            <a:extLst>
-              <a:ext uri="{28A0092B-C50C-407E-A947-70E740481C1C}">
-                <a14:useLocalDpi xmlns:a14="http://schemas.microsoft.com/office/drawing/2010/main" val="0"/>
-              </a:ext>
-            </a:extLst>
-          </a:blip>
-          <a:stretch>
-            <a:fillRect/>
-          </a:stretch>
-        </p:blipFill>
-        <p:spPr>
-          <a:xfrm>
-            <a:off x="4513267" y="17812499"/>
-            <a:ext cx="33568689" cy="16666019"/>
+        </p:nvSpPr>
+        <p:spPr>
+          <a:xfrm>
+            <a:off x="15778188" y="-32832500"/>
+            <a:ext cx="8720977" cy="1649811"/>
           </a:xfrm>
           <a:prstGeom prst="rect">
             <a:avLst/>
           </a:prstGeom>
-        </p:spPr>
-      </p:pic>
+          <a:noFill/>
+        </p:spPr>
+        <p:txBody>
+          <a:bodyPr wrap="none" rtlCol="0">
+            <a:spAutoFit/>
+          </a:bodyPr>
+          <a:lstStyle/>
+          <a:p>
+            <a:r>
+              <a:rPr lang="en-US" sz="10121" b="1" dirty="0">
+                <a:solidFill>
+                  <a:schemeClr val="tx1">
+                    <a:lumMod val="75000"/>
+                    <a:lumOff val="25000"/>
+                  </a:schemeClr>
+                </a:solidFill>
+              </a:rPr>
+              <a:t>Internet Service</a:t>
+            </a:r>
+          </a:p>
+        </p:txBody>
+      </p:sp>
+      <p:sp>
+        <p:nvSpPr>
+          <p:cNvPr id="11" name="TextBox 10">
+            <a:extLst>
+              <a:ext uri="{FF2B5EF4-FFF2-40B4-BE49-F238E27FC236}">
+                <a16:creationId xmlns:a16="http://schemas.microsoft.com/office/drawing/2014/main" id="{C8B4CDC9-8641-4E39-ABB2-2B72C29D2E63}"/>
+              </a:ext>
+            </a:extLst>
+          </p:cNvPr>
+          <p:cNvSpPr txBox="1"/>
+          <p:nvPr/>
+        </p:nvSpPr>
+        <p:spPr>
+          <a:xfrm>
+            <a:off x="15193701" y="-5146632"/>
+            <a:ext cx="9904571" cy="1649811"/>
+          </a:xfrm>
+          <a:prstGeom prst="rect">
+            <a:avLst/>
+          </a:prstGeom>
+          <a:noFill/>
+        </p:spPr>
+        <p:txBody>
+          <a:bodyPr wrap="none" rtlCol="0">
+            <a:spAutoFit/>
+          </a:bodyPr>
+          <a:lstStyle/>
+          <a:p>
+            <a:r>
+              <a:rPr lang="en-US" sz="10121" b="1" dirty="0">
+                <a:solidFill>
+                  <a:schemeClr val="tx1">
+                    <a:lumMod val="75000"/>
+                    <a:lumOff val="25000"/>
+                  </a:schemeClr>
+                </a:solidFill>
+              </a:rPr>
+              <a:t>Streaming Movies</a:t>
+            </a:r>
+          </a:p>
+        </p:txBody>
+      </p:sp>
+      <p:sp>
+        <p:nvSpPr>
+          <p:cNvPr id="12" name="TextBox 11">
+            <a:extLst>
+              <a:ext uri="{FF2B5EF4-FFF2-40B4-BE49-F238E27FC236}">
+                <a16:creationId xmlns:a16="http://schemas.microsoft.com/office/drawing/2014/main" id="{6A5A1B23-3A42-425C-BD36-5D8743D2F4F0}"/>
+              </a:ext>
+            </a:extLst>
+          </p:cNvPr>
+          <p:cNvSpPr txBox="1"/>
+          <p:nvPr/>
+        </p:nvSpPr>
+        <p:spPr>
+          <a:xfrm>
+            <a:off x="17635567" y="22438332"/>
+            <a:ext cx="4771947" cy="1649811"/>
+          </a:xfrm>
+          <a:prstGeom prst="rect">
+            <a:avLst/>
+          </a:prstGeom>
+          <a:noFill/>
+        </p:spPr>
+        <p:txBody>
+          <a:bodyPr wrap="none" rtlCol="0">
+            <a:spAutoFit/>
+          </a:bodyPr>
+          <a:lstStyle/>
+          <a:p>
+            <a:r>
+              <a:rPr lang="en-US" sz="10121" b="1" dirty="0">
+                <a:solidFill>
+                  <a:schemeClr val="tx1">
+                    <a:lumMod val="75000"/>
+                    <a:lumOff val="25000"/>
+                  </a:schemeClr>
+                </a:solidFill>
+              </a:rPr>
+              <a:t>Contract</a:t>
+            </a:r>
+          </a:p>
+        </p:txBody>
+      </p:sp>
     </p:spTree>
     <p:extLst>
       <p:ext uri="{BB962C8B-B14F-4D97-AF65-F5344CB8AC3E}">
-        <p14:creationId xmlns:p14="http://schemas.microsoft.com/office/powerpoint/2010/main" val="789113533"/>
+        <p14:creationId xmlns:p14="http://schemas.microsoft.com/office/powerpoint/2010/main" val="2420009140"/>
       </p:ext>
     </p:extLst>
   </p:cSld>
@@ -4110,12 +4219,138 @@
           <a:chExt cx="0" cy="0"/>
         </a:xfrm>
       </p:grpSpPr>
+      <p:sp>
+        <p:nvSpPr>
+          <p:cNvPr id="12" name="TextBox 11">
+            <a:extLst>
+              <a:ext uri="{FF2B5EF4-FFF2-40B4-BE49-F238E27FC236}">
+                <a16:creationId xmlns:a16="http://schemas.microsoft.com/office/drawing/2014/main" id="{AEF18B07-97E9-4957-A7F2-82BFF98CD549}"/>
+              </a:ext>
+            </a:extLst>
+          </p:cNvPr>
+          <p:cNvSpPr txBox="1"/>
+          <p:nvPr/>
+        </p:nvSpPr>
+        <p:spPr>
+          <a:xfrm>
+            <a:off x="-10807776" y="-3174025"/>
+            <a:ext cx="4110421" cy="1649811"/>
+          </a:xfrm>
+          <a:prstGeom prst="rect">
+            <a:avLst/>
+          </a:prstGeom>
+          <a:noFill/>
+        </p:spPr>
+        <p:txBody>
+          <a:bodyPr wrap="none" rtlCol="0">
+            <a:spAutoFit/>
+          </a:bodyPr>
+          <a:lstStyle/>
+          <a:p>
+            <a:r>
+              <a:rPr lang="en-US" sz="10121" dirty="0">
+                <a:solidFill>
+                  <a:schemeClr val="tx1">
+                    <a:lumMod val="75000"/>
+                    <a:lumOff val="25000"/>
+                  </a:schemeClr>
+                </a:solidFill>
+              </a:rPr>
+              <a:t>Gender</a:t>
+            </a:r>
+          </a:p>
+        </p:txBody>
+      </p:sp>
+      <p:sp>
+        <p:nvSpPr>
+          <p:cNvPr id="13" name="TextBox 12">
+            <a:extLst>
+              <a:ext uri="{FF2B5EF4-FFF2-40B4-BE49-F238E27FC236}">
+                <a16:creationId xmlns:a16="http://schemas.microsoft.com/office/drawing/2014/main" id="{FBF64AD6-C4DF-49ED-BC8F-3EA23861C5E2}"/>
+              </a:ext>
+            </a:extLst>
+          </p:cNvPr>
+          <p:cNvSpPr txBox="1"/>
+          <p:nvPr/>
+        </p:nvSpPr>
+        <p:spPr>
+          <a:xfrm>
+            <a:off x="48487359" y="-2777379"/>
+            <a:ext cx="4114588" cy="1649811"/>
+          </a:xfrm>
+          <a:prstGeom prst="rect">
+            <a:avLst/>
+          </a:prstGeom>
+          <a:noFill/>
+        </p:spPr>
+        <p:txBody>
+          <a:bodyPr wrap="none" rtlCol="0">
+            <a:spAutoFit/>
+          </a:bodyPr>
+          <a:lstStyle/>
+          <a:p>
+            <a:r>
+              <a:rPr lang="en-US" sz="10121" dirty="0">
+                <a:solidFill>
+                  <a:schemeClr val="tx1">
+                    <a:lumMod val="75000"/>
+                    <a:lumOff val="25000"/>
+                  </a:schemeClr>
+                </a:solidFill>
+              </a:rPr>
+              <a:t>Partner</a:t>
+            </a:r>
+          </a:p>
+        </p:txBody>
+      </p:sp>
+      <p:sp>
+        <p:nvSpPr>
+          <p:cNvPr id="15" name="TextBox 14">
+            <a:extLst>
+              <a:ext uri="{FF2B5EF4-FFF2-40B4-BE49-F238E27FC236}">
+                <a16:creationId xmlns:a16="http://schemas.microsoft.com/office/drawing/2014/main" id="{FEA00364-59C7-4F97-9634-D4816EE44F5A}"/>
+              </a:ext>
+            </a:extLst>
+          </p:cNvPr>
+          <p:cNvSpPr txBox="1"/>
+          <p:nvPr/>
+        </p:nvSpPr>
+        <p:spPr>
+          <a:xfrm>
+            <a:off x="17147953" y="15188583"/>
+            <a:ext cx="6576609" cy="1649811"/>
+          </a:xfrm>
+          <a:prstGeom prst="rect">
+            <a:avLst/>
+          </a:prstGeom>
+          <a:noFill/>
+        </p:spPr>
+        <p:txBody>
+          <a:bodyPr wrap="none" rtlCol="0">
+            <a:spAutoFit/>
+          </a:bodyPr>
+          <a:lstStyle/>
+          <a:p>
+            <a:r>
+              <a:rPr lang="en-US" sz="10121" dirty="0">
+                <a:solidFill>
+                  <a:schemeClr val="tx1">
+                    <a:lumMod val="75000"/>
+                    <a:lumOff val="25000"/>
+                  </a:schemeClr>
+                </a:solidFill>
+              </a:rPr>
+              <a:t>Dependents</a:t>
+            </a:r>
+          </a:p>
+        </p:txBody>
+      </p:sp>
       <p:pic>
         <p:nvPicPr>
-          <p:cNvPr id="6" name="Picture 5">
+          <p:cNvPr id="16" name="Picture 15">
             <a:extLst>
               <a:ext uri="{FF2B5EF4-FFF2-40B4-BE49-F238E27FC236}">
-                <a16:creationId xmlns:a16="http://schemas.microsoft.com/office/drawing/2014/main" id="{48C4C2A8-4B54-4783-BE12-2CDD28CE096D}"/>
+                <a16:creationId xmlns:a16="http://schemas.microsoft.com/office/drawing/2014/main" id="{99EF5F77-FEA5-4293-B306-DFDDA21FBF70}"/>
               </a:ext>
             </a:extLst>
           </p:cNvPr>
@@ -4132,8 +4367,206 @@
         </p:blipFill>
         <p:spPr>
           <a:xfrm>
-            <a:off x="-19102570" y="-33819943"/>
-            <a:ext cx="61688090" cy="98946973"/>
+            <a:off x="-13036970" y="-1114331"/>
+            <a:ext cx="67652401" cy="815213"/>
+          </a:xfrm>
+          <a:prstGeom prst="rect">
+            <a:avLst/>
+          </a:prstGeom>
+        </p:spPr>
+      </p:pic>
+      <p:pic>
+        <p:nvPicPr>
+          <p:cNvPr id="17" name="Picture 16">
+            <a:extLst>
+              <a:ext uri="{FF2B5EF4-FFF2-40B4-BE49-F238E27FC236}">
+                <a16:creationId xmlns:a16="http://schemas.microsoft.com/office/drawing/2014/main" id="{3B94BCCE-629F-4DD1-9BCA-BE4BF99BF0B1}"/>
+              </a:ext>
+            </a:extLst>
+          </p:cNvPr>
+          <p:cNvPicPr>
+            <a:picLocks noChangeAspect="1"/>
+          </p:cNvPicPr>
+          <p:nvPr/>
+        </p:nvPicPr>
+        <p:blipFill>
+          <a:blip r:embed="rId2"/>
+          <a:stretch>
+            <a:fillRect/>
+          </a:stretch>
+        </p:blipFill>
+        <p:spPr>
+          <a:xfrm>
+            <a:off x="-12528551" y="14112969"/>
+            <a:ext cx="67652401" cy="815213"/>
+          </a:xfrm>
+          <a:prstGeom prst="rect">
+            <a:avLst/>
+          </a:prstGeom>
+        </p:spPr>
+      </p:pic>
+      <p:pic>
+        <p:nvPicPr>
+          <p:cNvPr id="18" name="Picture 17">
+            <a:extLst>
+              <a:ext uri="{FF2B5EF4-FFF2-40B4-BE49-F238E27FC236}">
+                <a16:creationId xmlns:a16="http://schemas.microsoft.com/office/drawing/2014/main" id="{B57E42C6-F104-4884-A4E9-0AA5050B17D1}"/>
+              </a:ext>
+            </a:extLst>
+          </p:cNvPr>
+          <p:cNvPicPr>
+            <a:picLocks noChangeAspect="1"/>
+          </p:cNvPicPr>
+          <p:nvPr/>
+        </p:nvPicPr>
+        <p:blipFill>
+          <a:blip r:embed="rId2"/>
+          <a:stretch>
+            <a:fillRect/>
+          </a:stretch>
+        </p:blipFill>
+        <p:spPr>
+          <a:xfrm>
+            <a:off x="-11744605" y="17404879"/>
+            <a:ext cx="67652401" cy="815213"/>
+          </a:xfrm>
+          <a:prstGeom prst="rect">
+            <a:avLst/>
+          </a:prstGeom>
+        </p:spPr>
+      </p:pic>
+      <p:pic>
+        <p:nvPicPr>
+          <p:cNvPr id="19" name="Picture 18">
+            <a:extLst>
+              <a:ext uri="{FF2B5EF4-FFF2-40B4-BE49-F238E27FC236}">
+                <a16:creationId xmlns:a16="http://schemas.microsoft.com/office/drawing/2014/main" id="{C325B4C8-3A85-425B-80B2-23434C936A7F}"/>
+              </a:ext>
+            </a:extLst>
+          </p:cNvPr>
+          <p:cNvPicPr>
+            <a:picLocks noChangeAspect="1"/>
+          </p:cNvPicPr>
+          <p:nvPr/>
+        </p:nvPicPr>
+        <p:blipFill>
+          <a:blip r:embed="rId2"/>
+          <a:stretch>
+            <a:fillRect/>
+          </a:stretch>
+        </p:blipFill>
+        <p:spPr>
+          <a:xfrm>
+            <a:off x="-12528551" y="32745340"/>
+            <a:ext cx="67652401" cy="815213"/>
+          </a:xfrm>
+          <a:prstGeom prst="rect">
+            <a:avLst/>
+          </a:prstGeom>
+        </p:spPr>
+      </p:pic>
+      <p:pic>
+        <p:nvPicPr>
+          <p:cNvPr id="21" name="Picture 20">
+            <a:extLst>
+              <a:ext uri="{FF2B5EF4-FFF2-40B4-BE49-F238E27FC236}">
+                <a16:creationId xmlns:a16="http://schemas.microsoft.com/office/drawing/2014/main" id="{7D6D816F-B3B5-47CA-80D3-356E8F9B2285}"/>
+              </a:ext>
+            </a:extLst>
+          </p:cNvPr>
+          <p:cNvPicPr>
+            <a:picLocks noChangeAspect="1"/>
+          </p:cNvPicPr>
+          <p:nvPr/>
+        </p:nvPicPr>
+        <p:blipFill>
+          <a:blip r:embed="rId3">
+            <a:extLst>
+              <a:ext uri="{28A0092B-C50C-407E-A947-70E740481C1C}">
+                <a14:useLocalDpi xmlns:a14="http://schemas.microsoft.com/office/drawing/2010/main" val="0"/>
+              </a:ext>
+            </a:extLst>
+          </a:blip>
+          <a:stretch>
+            <a:fillRect/>
+          </a:stretch>
+        </p:blipFill>
+        <p:spPr>
+          <a:xfrm>
+            <a:off x="-13380366" y="-1012451"/>
+            <a:ext cx="33568689" cy="16666033"/>
+          </a:xfrm>
+          <a:prstGeom prst="rect">
+            <a:avLst/>
+          </a:prstGeom>
+        </p:spPr>
+      </p:pic>
+      <p:pic>
+        <p:nvPicPr>
+          <p:cNvPr id="23" name="Picture 22">
+            <a:extLst>
+              <a:ext uri="{FF2B5EF4-FFF2-40B4-BE49-F238E27FC236}">
+                <a16:creationId xmlns:a16="http://schemas.microsoft.com/office/drawing/2014/main" id="{FED83B2B-3F95-42B0-B0FB-A88F84CA3B4D}"/>
+              </a:ext>
+            </a:extLst>
+          </p:cNvPr>
+          <p:cNvPicPr>
+            <a:picLocks noChangeAspect="1"/>
+          </p:cNvPicPr>
+          <p:nvPr/>
+        </p:nvPicPr>
+        <p:blipFill>
+          <a:blip r:embed="rId4">
+            <a:extLst>
+              <a:ext uri="{28A0092B-C50C-407E-A947-70E740481C1C}">
+                <a14:useLocalDpi xmlns:a14="http://schemas.microsoft.com/office/drawing/2010/main" val="0"/>
+              </a:ext>
+            </a:extLst>
+          </a:blip>
+          <a:stretch>
+            <a:fillRect/>
+          </a:stretch>
+        </p:blipFill>
+        <p:spPr>
+          <a:xfrm>
+            <a:off x="22811045" y="-1114283"/>
+            <a:ext cx="32312744" cy="16042478"/>
+          </a:xfrm>
+          <a:prstGeom prst="rect">
+            <a:avLst/>
+          </a:prstGeom>
+        </p:spPr>
+      </p:pic>
+      <p:pic>
+        <p:nvPicPr>
+          <p:cNvPr id="25" name="Picture 24">
+            <a:extLst>
+              <a:ext uri="{FF2B5EF4-FFF2-40B4-BE49-F238E27FC236}">
+                <a16:creationId xmlns:a16="http://schemas.microsoft.com/office/drawing/2014/main" id="{63708039-D06A-4F3D-B808-A2CC6C3D8AFC}"/>
+              </a:ext>
+            </a:extLst>
+          </p:cNvPr>
+          <p:cNvPicPr>
+            <a:picLocks noChangeAspect="1"/>
+          </p:cNvPicPr>
+          <p:nvPr/>
+        </p:nvPicPr>
+        <p:blipFill>
+          <a:blip r:embed="rId5">
+            <a:extLst>
+              <a:ext uri="{28A0092B-C50C-407E-A947-70E740481C1C}">
+                <a14:useLocalDpi xmlns:a14="http://schemas.microsoft.com/office/drawing/2010/main" val="0"/>
+              </a:ext>
+            </a:extLst>
+          </a:blip>
+          <a:stretch>
+            <a:fillRect/>
+          </a:stretch>
+        </p:blipFill>
+        <p:spPr>
+          <a:xfrm>
+            <a:off x="4513267" y="17812499"/>
+            <a:ext cx="33568689" cy="16666019"/>
           </a:xfrm>
           <a:prstGeom prst="rect">
             <a:avLst/>
@@ -4143,7 +4576,7 @@
     </p:spTree>
     <p:extLst>
       <p:ext uri="{BB962C8B-B14F-4D97-AF65-F5344CB8AC3E}">
-        <p14:creationId xmlns:p14="http://schemas.microsoft.com/office/powerpoint/2010/main" val="3784708286"/>
+        <p14:creationId xmlns:p14="http://schemas.microsoft.com/office/powerpoint/2010/main" val="789113533"/>
       </p:ext>
     </p:extLst>
   </p:cSld>
@@ -4172,6 +4605,66 @@
       </p:grpSpPr>
       <p:pic>
         <p:nvPicPr>
+          <p:cNvPr id="6" name="Picture 5">
+            <a:extLst>
+              <a:ext uri="{FF2B5EF4-FFF2-40B4-BE49-F238E27FC236}">
+                <a16:creationId xmlns:a16="http://schemas.microsoft.com/office/drawing/2014/main" id="{48C4C2A8-4B54-4783-BE12-2CDD28CE096D}"/>
+              </a:ext>
+            </a:extLst>
+          </p:cNvPr>
+          <p:cNvPicPr>
+            <a:picLocks noChangeAspect="1"/>
+          </p:cNvPicPr>
+          <p:nvPr/>
+        </p:nvPicPr>
+        <p:blipFill>
+          <a:blip r:embed="rId2"/>
+          <a:stretch>
+            <a:fillRect/>
+          </a:stretch>
+        </p:blipFill>
+        <p:spPr>
+          <a:xfrm>
+            <a:off x="-19102570" y="-33819943"/>
+            <a:ext cx="61688090" cy="98946973"/>
+          </a:xfrm>
+          <a:prstGeom prst="rect">
+            <a:avLst/>
+          </a:prstGeom>
+        </p:spPr>
+      </p:pic>
+    </p:spTree>
+    <p:extLst>
+      <p:ext uri="{BB962C8B-B14F-4D97-AF65-F5344CB8AC3E}">
+        <p14:creationId xmlns:p14="http://schemas.microsoft.com/office/powerpoint/2010/main" val="3784708286"/>
+      </p:ext>
+    </p:extLst>
+  </p:cSld>
+  <p:clrMapOvr>
+    <a:masterClrMapping/>
+  </p:clrMapOvr>
+</p:sld>
+</file>
+
+<file path=ppt/slides/slide8.xml><?xml version="1.0" encoding="utf-8"?>
+<p:sld xmlns:a="http://schemas.openxmlformats.org/drawingml/2006/main" xmlns:r="http://schemas.openxmlformats.org/officeDocument/2006/relationships" xmlns:p="http://schemas.openxmlformats.org/presentationml/2006/main">
+  <p:cSld>
+    <p:spTree>
+      <p:nvGrpSpPr>
+        <p:cNvPr id="1" name=""/>
+        <p:cNvGrpSpPr/>
+        <p:nvPr/>
+      </p:nvGrpSpPr>
+      <p:grpSpPr>
+        <a:xfrm>
+          <a:off x="0" y="0"/>
+          <a:ext cx="0" cy="0"/>
+          <a:chOff x="0" y="0"/>
+          <a:chExt cx="0" cy="0"/>
+        </a:xfrm>
+      </p:grpSpPr>
+      <p:pic>
+        <p:nvPicPr>
           <p:cNvPr id="4" name="Picture 3">
             <a:extLst>
               <a:ext uri="{FF2B5EF4-FFF2-40B4-BE49-F238E27FC236}">
@@ -4303,7 +4796,7 @@
 </p:sld>
 </file>
 
-<file path=ppt/slides/slide8.xml><?xml version="1.0" encoding="utf-8"?>
+<file path=ppt/slides/slide9.xml><?xml version="1.0" encoding="utf-8"?>
 <p:sld xmlns:a="http://schemas.openxmlformats.org/drawingml/2006/main" xmlns:r="http://schemas.openxmlformats.org/officeDocument/2006/relationships" xmlns:p="http://schemas.openxmlformats.org/presentationml/2006/main">
   <p:cSld>
     <p:spTree>
@@ -4585,198 +5078,6 @@
     <p:extLst>
       <p:ext uri="{BB962C8B-B14F-4D97-AF65-F5344CB8AC3E}">
         <p14:creationId xmlns:p14="http://schemas.microsoft.com/office/powerpoint/2010/main" val="451830645"/>
-      </p:ext>
-    </p:extLst>
-  </p:cSld>
-  <p:clrMapOvr>
-    <a:masterClrMapping/>
-  </p:clrMapOvr>
-</p:sld>
-</file>
-
-<file path=ppt/slides/slide9.xml><?xml version="1.0" encoding="utf-8"?>
-<p:sld xmlns:a="http://schemas.openxmlformats.org/drawingml/2006/main" xmlns:r="http://schemas.openxmlformats.org/officeDocument/2006/relationships" xmlns:p="http://schemas.openxmlformats.org/presentationml/2006/main">
-  <p:cSld>
-    <p:spTree>
-      <p:nvGrpSpPr>
-        <p:cNvPr id="1" name=""/>
-        <p:cNvGrpSpPr/>
-        <p:nvPr/>
-      </p:nvGrpSpPr>
-      <p:grpSpPr>
-        <a:xfrm>
-          <a:off x="0" y="0"/>
-          <a:ext cx="0" cy="0"/>
-          <a:chOff x="0" y="0"/>
-          <a:chExt cx="0" cy="0"/>
-        </a:xfrm>
-      </p:grpSpPr>
-      <p:pic>
-        <p:nvPicPr>
-          <p:cNvPr id="4" name="Picture 3">
-            <a:extLst>
-              <a:ext uri="{FF2B5EF4-FFF2-40B4-BE49-F238E27FC236}">
-                <a16:creationId xmlns:a16="http://schemas.microsoft.com/office/drawing/2014/main" id="{6E22E914-C92B-4502-B0BA-E16ABF7C0888}"/>
-              </a:ext>
-            </a:extLst>
-          </p:cNvPr>
-          <p:cNvPicPr>
-            <a:picLocks noChangeAspect="1"/>
-          </p:cNvPicPr>
-          <p:nvPr/>
-        </p:nvPicPr>
-        <p:blipFill>
-          <a:blip r:embed="rId2">
-            <a:extLst>
-              <a:ext uri="{28A0092B-C50C-407E-A947-70E740481C1C}">
-                <a14:useLocalDpi xmlns:a14="http://schemas.microsoft.com/office/drawing/2010/main" val="0"/>
-              </a:ext>
-            </a:extLst>
-          </a:blip>
-          <a:stretch>
-            <a:fillRect/>
-          </a:stretch>
-        </p:blipFill>
-        <p:spPr>
-          <a:xfrm>
-            <a:off x="-98638135" y="-19959657"/>
-            <a:ext cx="147338471" cy="97841961"/>
-          </a:xfrm>
-          <a:prstGeom prst="rect">
-            <a:avLst/>
-          </a:prstGeom>
-        </p:spPr>
-      </p:pic>
-      <p:sp>
-        <p:nvSpPr>
-          <p:cNvPr id="7" name="Rectangle 6">
-            <a:extLst>
-              <a:ext uri="{FF2B5EF4-FFF2-40B4-BE49-F238E27FC236}">
-                <a16:creationId xmlns:a16="http://schemas.microsoft.com/office/drawing/2014/main" id="{EA3BE075-3365-4A2F-AEC1-75A7D916E0D0}"/>
-              </a:ext>
-            </a:extLst>
-          </p:cNvPr>
-          <p:cNvSpPr/>
-          <p:nvPr/>
-        </p:nvSpPr>
-        <p:spPr>
-          <a:xfrm>
-            <a:off x="-8226294" y="-11502811"/>
-            <a:ext cx="8067884" cy="2649156"/>
-          </a:xfrm>
-          <a:prstGeom prst="rect">
-            <a:avLst/>
-          </a:prstGeom>
-          <a:solidFill>
-            <a:srgbClr val="FB1E1F"/>
-          </a:solidFill>
-          <a:ln>
-            <a:solidFill>
-              <a:schemeClr val="bg1"/>
-            </a:solidFill>
-          </a:ln>
-        </p:spPr>
-        <p:style>
-          <a:lnRef idx="2">
-            <a:schemeClr val="accent1">
-              <a:shade val="50000"/>
-            </a:schemeClr>
-          </a:lnRef>
-          <a:fillRef idx="1">
-            <a:schemeClr val="accent1"/>
-          </a:fillRef>
-          <a:effectRef idx="0">
-            <a:schemeClr val="accent1"/>
-          </a:effectRef>
-          <a:fontRef idx="minor">
-            <a:schemeClr val="lt1"/>
-          </a:fontRef>
-        </p:style>
-        <p:txBody>
-          <a:bodyPr rot="0" spcFirstLastPara="0" vertOverflow="overflow" horzOverflow="overflow" vert="horz" wrap="square" lIns="288999" tIns="144499" rIns="288999" bIns="144499" numCol="1" spcCol="0" rtlCol="0" fromWordArt="0" anchor="ctr" anchorCtr="0" forceAA="0" compatLnSpc="1">
-            <a:prstTxWarp prst="textNoShape">
-              <a:avLst/>
-            </a:prstTxWarp>
-            <a:noAutofit/>
-          </a:bodyPr>
-          <a:lstStyle/>
-          <a:p>
-            <a:pPr algn="ctr"/>
-            <a:endParaRPr lang="en-US" sz="5689" dirty="0">
-              <a:solidFill>
-                <a:srgbClr val="FC2324"/>
-              </a:solidFill>
-            </a:endParaRPr>
-          </a:p>
-        </p:txBody>
-      </p:sp>
-      <p:sp>
-        <p:nvSpPr>
-          <p:cNvPr id="9" name="Rectangle 8">
-            <a:extLst>
-              <a:ext uri="{FF2B5EF4-FFF2-40B4-BE49-F238E27FC236}">
-                <a16:creationId xmlns:a16="http://schemas.microsoft.com/office/drawing/2014/main" id="{299DAE4F-2657-465E-A7C4-CEFCF84C127D}"/>
-              </a:ext>
-            </a:extLst>
-          </p:cNvPr>
-          <p:cNvSpPr/>
-          <p:nvPr/>
-        </p:nvSpPr>
-        <p:spPr>
-          <a:xfrm>
-            <a:off x="-8226294" y="-5605514"/>
-            <a:ext cx="8067884" cy="2649156"/>
-          </a:xfrm>
-          <a:prstGeom prst="rect">
-            <a:avLst/>
-          </a:prstGeom>
-          <a:solidFill>
-            <a:srgbClr val="6262F9"/>
-          </a:solidFill>
-          <a:ln>
-            <a:solidFill>
-              <a:schemeClr val="bg1"/>
-            </a:solidFill>
-          </a:ln>
-        </p:spPr>
-        <p:style>
-          <a:lnRef idx="2">
-            <a:schemeClr val="accent1">
-              <a:shade val="50000"/>
-            </a:schemeClr>
-          </a:lnRef>
-          <a:fillRef idx="1">
-            <a:schemeClr val="accent1"/>
-          </a:fillRef>
-          <a:effectRef idx="0">
-            <a:schemeClr val="accent1"/>
-          </a:effectRef>
-          <a:fontRef idx="minor">
-            <a:schemeClr val="lt1"/>
-          </a:fontRef>
-        </p:style>
-        <p:txBody>
-          <a:bodyPr rot="0" spcFirstLastPara="0" vertOverflow="overflow" horzOverflow="overflow" vert="horz" wrap="square" lIns="288999" tIns="144499" rIns="288999" bIns="144499" numCol="1" spcCol="0" rtlCol="0" fromWordArt="0" anchor="ctr" anchorCtr="0" forceAA="0" compatLnSpc="1">
-            <a:prstTxWarp prst="textNoShape">
-              <a:avLst/>
-            </a:prstTxWarp>
-            <a:noAutofit/>
-          </a:bodyPr>
-          <a:lstStyle/>
-          <a:p>
-            <a:pPr algn="ctr"/>
-            <a:endParaRPr lang="en-US" sz="5689" dirty="0">
-              <a:solidFill>
-                <a:srgbClr val="FC2324"/>
-              </a:solidFill>
-            </a:endParaRPr>
-          </a:p>
-        </p:txBody>
-      </p:sp>
-    </p:spTree>
-    <p:extLst>
-      <p:ext uri="{BB962C8B-B14F-4D97-AF65-F5344CB8AC3E}">
-        <p14:creationId xmlns:p14="http://schemas.microsoft.com/office/powerpoint/2010/main" val="3183363762"/>
       </p:ext>
     </p:extLst>
   </p:cSld>

</xml_diff>